<commit_message>
Agregado el arbol de utilidad
</commit_message>
<xml_diff>
--- a/CSOF5204 Arquitectura de Software/0609PrimeraEntregaSAD.pptx
+++ b/CSOF5204 Arquitectura de Software/0609PrimeraEntregaSAD.pptx
@@ -13933,6 +13933,88 @@
 </p:notesMaster>
 </file>
 
+<file path=ppt/notesSlides/notesSlide1.xml><?xml version="1.0" encoding="utf-8"?>
+<p:notes xmlns:a="http://schemas.openxmlformats.org/drawingml/2006/main" xmlns:r="http://schemas.openxmlformats.org/officeDocument/2006/relationships" xmlns:p="http://schemas.openxmlformats.org/presentationml/2006/main">
+  <p:cSld>
+    <p:spTree>
+      <p:nvGrpSpPr>
+        <p:cNvPr id="1" name=""/>
+        <p:cNvGrpSpPr/>
+        <p:nvPr/>
+      </p:nvGrpSpPr>
+      <p:grpSpPr>
+        <a:xfrm>
+          <a:off x="0" y="0"/>
+          <a:ext cx="0" cy="0"/>
+          <a:chOff x="0" y="0"/>
+          <a:chExt cx="0" cy="0"/>
+        </a:xfrm>
+      </p:grpSpPr>
+      <p:sp>
+        <p:nvSpPr>
+          <p:cNvPr id="2" name="Slide Image Placeholder 1"/>
+          <p:cNvSpPr>
+            <a:spLocks noGrp="1" noRot="1" noChangeAspect="1"/>
+          </p:cNvSpPr>
+          <p:nvPr>
+            <p:ph type="sldImg"/>
+          </p:nvPr>
+        </p:nvSpPr>
+        <p:spPr/>
+      </p:sp>
+      <p:sp>
+        <p:nvSpPr>
+          <p:cNvPr id="3" name="Notes Placeholder 2"/>
+          <p:cNvSpPr>
+            <a:spLocks noGrp="1"/>
+          </p:cNvSpPr>
+          <p:nvPr>
+            <p:ph type="body" idx="1"/>
+          </p:nvPr>
+        </p:nvSpPr>
+        <p:spPr/>
+        <p:txBody>
+          <a:bodyPr>
+            <a:normAutofit/>
+          </a:bodyPr>
+          <a:lstStyle/>
+          <a:p>
+            <a:endParaRPr lang="es-CO" dirty="0"/>
+          </a:p>
+        </p:txBody>
+      </p:sp>
+      <p:sp>
+        <p:nvSpPr>
+          <p:cNvPr id="4" name="Slide Number Placeholder 3"/>
+          <p:cNvSpPr>
+            <a:spLocks noGrp="1"/>
+          </p:cNvSpPr>
+          <p:nvPr>
+            <p:ph type="sldNum" sz="quarter" idx="10"/>
+          </p:nvPr>
+        </p:nvSpPr>
+        <p:spPr/>
+        <p:txBody>
+          <a:bodyPr/>
+          <a:lstStyle/>
+          <a:p>
+            <a:fld id="{6E195558-F735-488E-B766-BCBB520D0067}" type="slidenum">
+              <a:rPr lang="es-CO" smtClean="0"/>
+              <a:pPr/>
+              <a:t>8</a:t>
+            </a:fld>
+            <a:endParaRPr lang="es-CO"/>
+          </a:p>
+        </p:txBody>
+      </p:sp>
+    </p:spTree>
+  </p:cSld>
+  <p:clrMapOvr>
+    <a:masterClrMapping/>
+  </p:clrMapOvr>
+</p:notes>
+</file>
+
 <file path=ppt/slideLayouts/slideLayout1.xml><?xml version="1.0" encoding="utf-8"?>
 <p:sldLayout xmlns:a="http://schemas.openxmlformats.org/drawingml/2006/main" xmlns:r="http://schemas.openxmlformats.org/officeDocument/2006/relationships" xmlns:p="http://schemas.openxmlformats.org/presentationml/2006/main" type="title" preserve="1">
   <p:cSld name="Diapositiva de título">
@@ -19935,6 +20017,634 @@
           <a:chExt cx="0" cy="0"/>
         </a:xfrm>
       </p:grpSpPr>
+      <p:sp>
+        <p:nvSpPr>
+          <p:cNvPr id="53" name="Rounded Rectangle 52"/>
+          <p:cNvSpPr/>
+          <p:nvPr/>
+        </p:nvSpPr>
+        <p:spPr>
+          <a:xfrm>
+            <a:off x="8172400" y="980728"/>
+            <a:ext cx="360040" cy="360040"/>
+          </a:xfrm>
+          <a:prstGeom prst="roundRect">
+            <a:avLst/>
+          </a:prstGeom>
+        </p:spPr>
+        <p:style>
+          <a:lnRef idx="1">
+            <a:schemeClr val="dk1"/>
+          </a:lnRef>
+          <a:fillRef idx="2">
+            <a:schemeClr val="dk1"/>
+          </a:fillRef>
+          <a:effectRef idx="1">
+            <a:schemeClr val="dk1"/>
+          </a:effectRef>
+          <a:fontRef idx="minor">
+            <a:schemeClr val="dk1"/>
+          </a:fontRef>
+        </p:style>
+        <p:txBody>
+          <a:bodyPr rtlCol="0" anchor="t"/>
+          <a:lstStyle/>
+          <a:p>
+            <a:pPr algn="ctr"/>
+            <a:r>
+              <a:rPr lang="es-CO" sz="1600" b="1" dirty="0" smtClean="0">
+                <a:effectLst>
+                  <a:outerShdw blurRad="38100" dist="38100" dir="2700000" algn="tl">
+                    <a:srgbClr val="000000">
+                      <a:alpha val="43137"/>
+                    </a:srgbClr>
+                  </a:outerShdw>
+                </a:effectLst>
+              </a:rPr>
+              <a:t>N</a:t>
+            </a:r>
+            <a:endParaRPr lang="es-CO" sz="1600" b="1" dirty="0">
+              <a:effectLst>
+                <a:outerShdw blurRad="38100" dist="38100" dir="2700000" algn="tl">
+                  <a:srgbClr val="000000">
+                    <a:alpha val="43137"/>
+                  </a:srgbClr>
+                </a:outerShdw>
+              </a:effectLst>
+            </a:endParaRPr>
+          </a:p>
+        </p:txBody>
+      </p:sp>
+      <p:sp>
+        <p:nvSpPr>
+          <p:cNvPr id="19" name="Rounded Rectangle 18"/>
+          <p:cNvSpPr/>
+          <p:nvPr/>
+        </p:nvSpPr>
+        <p:spPr>
+          <a:xfrm>
+            <a:off x="4085104" y="1407056"/>
+            <a:ext cx="822960" cy="365760"/>
+          </a:xfrm>
+          <a:prstGeom prst="roundRect">
+            <a:avLst/>
+          </a:prstGeom>
+        </p:spPr>
+        <p:style>
+          <a:lnRef idx="1">
+            <a:schemeClr val="accent1"/>
+          </a:lnRef>
+          <a:fillRef idx="3">
+            <a:schemeClr val="accent1"/>
+          </a:fillRef>
+          <a:effectRef idx="2">
+            <a:schemeClr val="accent1"/>
+          </a:effectRef>
+          <a:fontRef idx="minor">
+            <a:schemeClr val="lt1"/>
+          </a:fontRef>
+        </p:style>
+        <p:txBody>
+          <a:bodyPr rtlCol="0" anchor="ctr"/>
+          <a:lstStyle/>
+          <a:p>
+            <a:r>
+              <a:rPr lang="es-CO" sz="1400" b="1" dirty="0" smtClean="0">
+                <a:effectLst>
+                  <a:outerShdw blurRad="38100" dist="38100" dir="2700000" algn="tl">
+                    <a:srgbClr val="000000">
+                      <a:alpha val="43137"/>
+                    </a:srgbClr>
+                  </a:outerShdw>
+                </a:effectLst>
+              </a:rPr>
+              <a:t>EC02</a:t>
+            </a:r>
+            <a:endParaRPr lang="es-CO" sz="1400" b="1" dirty="0">
+              <a:effectLst>
+                <a:outerShdw blurRad="38100" dist="38100" dir="2700000" algn="tl">
+                  <a:srgbClr val="000000">
+                    <a:alpha val="43137"/>
+                  </a:srgbClr>
+                </a:outerShdw>
+              </a:effectLst>
+            </a:endParaRPr>
+          </a:p>
+        </p:txBody>
+      </p:sp>
+      <p:sp>
+        <p:nvSpPr>
+          <p:cNvPr id="20" name="Rounded Rectangle 19"/>
+          <p:cNvSpPr/>
+          <p:nvPr/>
+        </p:nvSpPr>
+        <p:spPr>
+          <a:xfrm>
+            <a:off x="4085104" y="1951116"/>
+            <a:ext cx="822960" cy="365760"/>
+          </a:xfrm>
+          <a:prstGeom prst="roundRect">
+            <a:avLst/>
+          </a:prstGeom>
+        </p:spPr>
+        <p:style>
+          <a:lnRef idx="1">
+            <a:schemeClr val="accent1"/>
+          </a:lnRef>
+          <a:fillRef idx="3">
+            <a:schemeClr val="accent1"/>
+          </a:fillRef>
+          <a:effectRef idx="2">
+            <a:schemeClr val="accent1"/>
+          </a:effectRef>
+          <a:fontRef idx="minor">
+            <a:schemeClr val="lt1"/>
+          </a:fontRef>
+        </p:style>
+        <p:txBody>
+          <a:bodyPr rtlCol="0" anchor="ctr"/>
+          <a:lstStyle/>
+          <a:p>
+            <a:r>
+              <a:rPr lang="es-CO" sz="1400" b="1" dirty="0" smtClean="0">
+                <a:effectLst>
+                  <a:outerShdw blurRad="38100" dist="38100" dir="2700000" algn="tl">
+                    <a:srgbClr val="000000">
+                      <a:alpha val="43137"/>
+                    </a:srgbClr>
+                  </a:outerShdw>
+                </a:effectLst>
+              </a:rPr>
+              <a:t>EC01</a:t>
+            </a:r>
+            <a:endParaRPr lang="es-CO" sz="1400" b="1" dirty="0">
+              <a:effectLst>
+                <a:outerShdw blurRad="38100" dist="38100" dir="2700000" algn="tl">
+                  <a:srgbClr val="000000">
+                    <a:alpha val="43137"/>
+                  </a:srgbClr>
+                </a:outerShdw>
+              </a:effectLst>
+            </a:endParaRPr>
+          </a:p>
+        </p:txBody>
+      </p:sp>
+      <p:sp>
+        <p:nvSpPr>
+          <p:cNvPr id="21" name="Rounded Rectangle 20"/>
+          <p:cNvSpPr/>
+          <p:nvPr/>
+        </p:nvSpPr>
+        <p:spPr>
+          <a:xfrm>
+            <a:off x="4085104" y="2495176"/>
+            <a:ext cx="822960" cy="365760"/>
+          </a:xfrm>
+          <a:prstGeom prst="roundRect">
+            <a:avLst/>
+          </a:prstGeom>
+        </p:spPr>
+        <p:style>
+          <a:lnRef idx="1">
+            <a:schemeClr val="accent1"/>
+          </a:lnRef>
+          <a:fillRef idx="3">
+            <a:schemeClr val="accent1"/>
+          </a:fillRef>
+          <a:effectRef idx="2">
+            <a:schemeClr val="accent1"/>
+          </a:effectRef>
+          <a:fontRef idx="minor">
+            <a:schemeClr val="lt1"/>
+          </a:fontRef>
+        </p:style>
+        <p:txBody>
+          <a:bodyPr rtlCol="0" anchor="ctr"/>
+          <a:lstStyle/>
+          <a:p>
+            <a:r>
+              <a:rPr lang="es-CO" sz="1400" b="1" dirty="0" smtClean="0">
+                <a:effectLst>
+                  <a:outerShdw blurRad="38100" dist="38100" dir="2700000" algn="tl">
+                    <a:srgbClr val="000000">
+                      <a:alpha val="43137"/>
+                    </a:srgbClr>
+                  </a:outerShdw>
+                </a:effectLst>
+              </a:rPr>
+              <a:t>EC06</a:t>
+            </a:r>
+            <a:endParaRPr lang="es-CO" sz="1400" b="1" dirty="0">
+              <a:effectLst>
+                <a:outerShdw blurRad="38100" dist="38100" dir="2700000" algn="tl">
+                  <a:srgbClr val="000000">
+                    <a:alpha val="43137"/>
+                  </a:srgbClr>
+                </a:outerShdw>
+              </a:effectLst>
+            </a:endParaRPr>
+          </a:p>
+        </p:txBody>
+      </p:sp>
+      <p:sp>
+        <p:nvSpPr>
+          <p:cNvPr id="22" name="Rounded Rectangle 21"/>
+          <p:cNvSpPr/>
+          <p:nvPr/>
+        </p:nvSpPr>
+        <p:spPr>
+          <a:xfrm>
+            <a:off x="4085104" y="3039236"/>
+            <a:ext cx="822960" cy="365760"/>
+          </a:xfrm>
+          <a:prstGeom prst="roundRect">
+            <a:avLst/>
+          </a:prstGeom>
+        </p:spPr>
+        <p:style>
+          <a:lnRef idx="1">
+            <a:schemeClr val="accent1"/>
+          </a:lnRef>
+          <a:fillRef idx="3">
+            <a:schemeClr val="accent1"/>
+          </a:fillRef>
+          <a:effectRef idx="2">
+            <a:schemeClr val="accent1"/>
+          </a:effectRef>
+          <a:fontRef idx="minor">
+            <a:schemeClr val="lt1"/>
+          </a:fontRef>
+        </p:style>
+        <p:txBody>
+          <a:bodyPr rtlCol="0" anchor="ctr"/>
+          <a:lstStyle/>
+          <a:p>
+            <a:r>
+              <a:rPr lang="es-CO" sz="1400" b="1" dirty="0" smtClean="0">
+                <a:effectLst>
+                  <a:outerShdw blurRad="38100" dist="38100" dir="2700000" algn="tl">
+                    <a:srgbClr val="000000">
+                      <a:alpha val="43137"/>
+                    </a:srgbClr>
+                  </a:outerShdw>
+                </a:effectLst>
+              </a:rPr>
+              <a:t>EC09</a:t>
+            </a:r>
+            <a:endParaRPr lang="es-CO" sz="1400" b="1" dirty="0">
+              <a:effectLst>
+                <a:outerShdw blurRad="38100" dist="38100" dir="2700000" algn="tl">
+                  <a:srgbClr val="000000">
+                    <a:alpha val="43137"/>
+                  </a:srgbClr>
+                </a:outerShdw>
+              </a:effectLst>
+            </a:endParaRPr>
+          </a:p>
+        </p:txBody>
+      </p:sp>
+      <p:sp>
+        <p:nvSpPr>
+          <p:cNvPr id="23" name="Rounded Rectangle 22"/>
+          <p:cNvSpPr/>
+          <p:nvPr/>
+        </p:nvSpPr>
+        <p:spPr>
+          <a:xfrm>
+            <a:off x="4085104" y="3583296"/>
+            <a:ext cx="822960" cy="365760"/>
+          </a:xfrm>
+          <a:prstGeom prst="roundRect">
+            <a:avLst/>
+          </a:prstGeom>
+        </p:spPr>
+        <p:style>
+          <a:lnRef idx="1">
+            <a:schemeClr val="accent1"/>
+          </a:lnRef>
+          <a:fillRef idx="3">
+            <a:schemeClr val="accent1"/>
+          </a:fillRef>
+          <a:effectRef idx="2">
+            <a:schemeClr val="accent1"/>
+          </a:effectRef>
+          <a:fontRef idx="minor">
+            <a:schemeClr val="lt1"/>
+          </a:fontRef>
+        </p:style>
+        <p:txBody>
+          <a:bodyPr rtlCol="0" anchor="ctr"/>
+          <a:lstStyle/>
+          <a:p>
+            <a:r>
+              <a:rPr lang="es-CO" sz="1400" b="1" dirty="0" smtClean="0">
+                <a:effectLst>
+                  <a:outerShdw blurRad="38100" dist="38100" dir="2700000" algn="tl">
+                    <a:srgbClr val="000000">
+                      <a:alpha val="43137"/>
+                    </a:srgbClr>
+                  </a:outerShdw>
+                </a:effectLst>
+              </a:rPr>
+              <a:t>EC10</a:t>
+            </a:r>
+            <a:endParaRPr lang="es-CO" sz="1400" b="1" dirty="0">
+              <a:effectLst>
+                <a:outerShdw blurRad="38100" dist="38100" dir="2700000" algn="tl">
+                  <a:srgbClr val="000000">
+                    <a:alpha val="43137"/>
+                  </a:srgbClr>
+                </a:outerShdw>
+              </a:effectLst>
+            </a:endParaRPr>
+          </a:p>
+        </p:txBody>
+      </p:sp>
+      <p:sp>
+        <p:nvSpPr>
+          <p:cNvPr id="24" name="Rounded Rectangle 23"/>
+          <p:cNvSpPr/>
+          <p:nvPr/>
+        </p:nvSpPr>
+        <p:spPr>
+          <a:xfrm>
+            <a:off x="4085104" y="4135358"/>
+            <a:ext cx="822960" cy="365760"/>
+          </a:xfrm>
+          <a:prstGeom prst="roundRect">
+            <a:avLst/>
+          </a:prstGeom>
+        </p:spPr>
+        <p:style>
+          <a:lnRef idx="1">
+            <a:schemeClr val="accent1"/>
+          </a:lnRef>
+          <a:fillRef idx="3">
+            <a:schemeClr val="accent1"/>
+          </a:fillRef>
+          <a:effectRef idx="2">
+            <a:schemeClr val="accent1"/>
+          </a:effectRef>
+          <a:fontRef idx="minor">
+            <a:schemeClr val="lt1"/>
+          </a:fontRef>
+        </p:style>
+        <p:txBody>
+          <a:bodyPr rtlCol="0" anchor="ctr"/>
+          <a:lstStyle/>
+          <a:p>
+            <a:r>
+              <a:rPr lang="es-CO" sz="1400" b="1" dirty="0" smtClean="0">
+                <a:effectLst>
+                  <a:outerShdw blurRad="38100" dist="38100" dir="2700000" algn="tl">
+                    <a:srgbClr val="000000">
+                      <a:alpha val="43137"/>
+                    </a:srgbClr>
+                  </a:outerShdw>
+                </a:effectLst>
+              </a:rPr>
+              <a:t>EC08</a:t>
+            </a:r>
+            <a:endParaRPr lang="es-CO" sz="1400" b="1" dirty="0">
+              <a:effectLst>
+                <a:outerShdw blurRad="38100" dist="38100" dir="2700000" algn="tl">
+                  <a:srgbClr val="000000">
+                    <a:alpha val="43137"/>
+                  </a:srgbClr>
+                </a:outerShdw>
+              </a:effectLst>
+            </a:endParaRPr>
+          </a:p>
+        </p:txBody>
+      </p:sp>
+      <p:sp>
+        <p:nvSpPr>
+          <p:cNvPr id="25" name="Rounded Rectangle 24"/>
+          <p:cNvSpPr/>
+          <p:nvPr/>
+        </p:nvSpPr>
+        <p:spPr>
+          <a:xfrm>
+            <a:off x="4085104" y="4671416"/>
+            <a:ext cx="822960" cy="365760"/>
+          </a:xfrm>
+          <a:prstGeom prst="roundRect">
+            <a:avLst/>
+          </a:prstGeom>
+        </p:spPr>
+        <p:style>
+          <a:lnRef idx="1">
+            <a:schemeClr val="accent1"/>
+          </a:lnRef>
+          <a:fillRef idx="3">
+            <a:schemeClr val="accent1"/>
+          </a:fillRef>
+          <a:effectRef idx="2">
+            <a:schemeClr val="accent1"/>
+          </a:effectRef>
+          <a:fontRef idx="minor">
+            <a:schemeClr val="lt1"/>
+          </a:fontRef>
+        </p:style>
+        <p:txBody>
+          <a:bodyPr rtlCol="0" anchor="ctr"/>
+          <a:lstStyle/>
+          <a:p>
+            <a:r>
+              <a:rPr lang="es-CO" sz="1400" b="1" dirty="0" smtClean="0">
+                <a:effectLst>
+                  <a:outerShdw blurRad="38100" dist="38100" dir="2700000" algn="tl">
+                    <a:srgbClr val="000000">
+                      <a:alpha val="43137"/>
+                    </a:srgbClr>
+                  </a:outerShdw>
+                </a:effectLst>
+              </a:rPr>
+              <a:t>EC05</a:t>
+            </a:r>
+            <a:endParaRPr lang="es-CO" sz="1400" b="1" dirty="0">
+              <a:effectLst>
+                <a:outerShdw blurRad="38100" dist="38100" dir="2700000" algn="tl">
+                  <a:srgbClr val="000000">
+                    <a:alpha val="43137"/>
+                  </a:srgbClr>
+                </a:outerShdw>
+              </a:effectLst>
+            </a:endParaRPr>
+          </a:p>
+        </p:txBody>
+      </p:sp>
+      <p:sp>
+        <p:nvSpPr>
+          <p:cNvPr id="26" name="Rounded Rectangle 25"/>
+          <p:cNvSpPr/>
+          <p:nvPr/>
+        </p:nvSpPr>
+        <p:spPr>
+          <a:xfrm>
+            <a:off x="4085104" y="5215476"/>
+            <a:ext cx="822960" cy="365760"/>
+          </a:xfrm>
+          <a:prstGeom prst="roundRect">
+            <a:avLst/>
+          </a:prstGeom>
+        </p:spPr>
+        <p:style>
+          <a:lnRef idx="1">
+            <a:schemeClr val="accent1"/>
+          </a:lnRef>
+          <a:fillRef idx="3">
+            <a:schemeClr val="accent1"/>
+          </a:fillRef>
+          <a:effectRef idx="2">
+            <a:schemeClr val="accent1"/>
+          </a:effectRef>
+          <a:fontRef idx="minor">
+            <a:schemeClr val="lt1"/>
+          </a:fontRef>
+        </p:style>
+        <p:txBody>
+          <a:bodyPr rtlCol="0" anchor="ctr"/>
+          <a:lstStyle/>
+          <a:p>
+            <a:r>
+              <a:rPr lang="es-CO" sz="1400" b="1" dirty="0" smtClean="0">
+                <a:effectLst>
+                  <a:outerShdw blurRad="38100" dist="38100" dir="2700000" algn="tl">
+                    <a:srgbClr val="000000">
+                      <a:alpha val="43137"/>
+                    </a:srgbClr>
+                  </a:outerShdw>
+                </a:effectLst>
+              </a:rPr>
+              <a:t>EC07</a:t>
+            </a:r>
+            <a:endParaRPr lang="es-CO" sz="1400" b="1" dirty="0">
+              <a:effectLst>
+                <a:outerShdw blurRad="38100" dist="38100" dir="2700000" algn="tl">
+                  <a:srgbClr val="000000">
+                    <a:alpha val="43137"/>
+                  </a:srgbClr>
+                </a:outerShdw>
+              </a:effectLst>
+            </a:endParaRPr>
+          </a:p>
+        </p:txBody>
+      </p:sp>
+      <p:sp>
+        <p:nvSpPr>
+          <p:cNvPr id="27" name="Rounded Rectangle 26"/>
+          <p:cNvSpPr/>
+          <p:nvPr/>
+        </p:nvSpPr>
+        <p:spPr>
+          <a:xfrm>
+            <a:off x="4085104" y="5759536"/>
+            <a:ext cx="822960" cy="365760"/>
+          </a:xfrm>
+          <a:prstGeom prst="roundRect">
+            <a:avLst/>
+          </a:prstGeom>
+        </p:spPr>
+        <p:style>
+          <a:lnRef idx="1">
+            <a:schemeClr val="accent1"/>
+          </a:lnRef>
+          <a:fillRef idx="3">
+            <a:schemeClr val="accent1"/>
+          </a:fillRef>
+          <a:effectRef idx="2">
+            <a:schemeClr val="accent1"/>
+          </a:effectRef>
+          <a:fontRef idx="minor">
+            <a:schemeClr val="lt1"/>
+          </a:fontRef>
+        </p:style>
+        <p:txBody>
+          <a:bodyPr rtlCol="0" anchor="ctr"/>
+          <a:lstStyle/>
+          <a:p>
+            <a:r>
+              <a:rPr lang="es-CO" sz="1400" b="1" dirty="0" smtClean="0">
+                <a:effectLst>
+                  <a:outerShdw blurRad="38100" dist="38100" dir="2700000" algn="tl">
+                    <a:srgbClr val="000000">
+                      <a:alpha val="43137"/>
+                    </a:srgbClr>
+                  </a:outerShdw>
+                </a:effectLst>
+              </a:rPr>
+              <a:t>EC04</a:t>
+            </a:r>
+            <a:endParaRPr lang="es-CO" sz="1400" b="1" dirty="0">
+              <a:effectLst>
+                <a:outerShdw blurRad="38100" dist="38100" dir="2700000" algn="tl">
+                  <a:srgbClr val="000000">
+                    <a:alpha val="43137"/>
+                  </a:srgbClr>
+                </a:outerShdw>
+              </a:effectLst>
+            </a:endParaRPr>
+          </a:p>
+        </p:txBody>
+      </p:sp>
+      <p:sp>
+        <p:nvSpPr>
+          <p:cNvPr id="28" name="Rounded Rectangle 27"/>
+          <p:cNvSpPr/>
+          <p:nvPr/>
+        </p:nvSpPr>
+        <p:spPr>
+          <a:xfrm>
+            <a:off x="4085104" y="6303600"/>
+            <a:ext cx="822960" cy="365760"/>
+          </a:xfrm>
+          <a:prstGeom prst="roundRect">
+            <a:avLst/>
+          </a:prstGeom>
+        </p:spPr>
+        <p:style>
+          <a:lnRef idx="1">
+            <a:schemeClr val="accent1"/>
+          </a:lnRef>
+          <a:fillRef idx="3">
+            <a:schemeClr val="accent1"/>
+          </a:fillRef>
+          <a:effectRef idx="2">
+            <a:schemeClr val="accent1"/>
+          </a:effectRef>
+          <a:fontRef idx="minor">
+            <a:schemeClr val="lt1"/>
+          </a:fontRef>
+        </p:style>
+        <p:txBody>
+          <a:bodyPr rtlCol="0" anchor="ctr"/>
+          <a:lstStyle/>
+          <a:p>
+            <a:r>
+              <a:rPr lang="es-CO" sz="1400" b="1" dirty="0" smtClean="0">
+                <a:effectLst>
+                  <a:outerShdw blurRad="38100" dist="38100" dir="2700000" algn="tl">
+                    <a:srgbClr val="000000">
+                      <a:alpha val="43137"/>
+                    </a:srgbClr>
+                  </a:outerShdw>
+                </a:effectLst>
+              </a:rPr>
+              <a:t>EC03</a:t>
+            </a:r>
+            <a:endParaRPr lang="es-CO" sz="1400" b="1" dirty="0">
+              <a:effectLst>
+                <a:outerShdw blurRad="38100" dist="38100" dir="2700000" algn="tl">
+                  <a:srgbClr val="000000">
+                    <a:alpha val="43137"/>
+                  </a:srgbClr>
+                </a:outerShdw>
+              </a:effectLst>
+            </a:endParaRPr>
+          </a:p>
+        </p:txBody>
+      </p:sp>
       <p:pic>
         <p:nvPicPr>
           <p:cNvPr id="4" name="Picture 3" descr="F:\[ECOS]\ingenium-managment\ingenium-logo.png"/>
@@ -19944,7 +20654,7 @@
           <p:nvPr/>
         </p:nvPicPr>
         <p:blipFill>
-          <a:blip r:embed="rId2" cstate="print"/>
+          <a:blip r:embed="rId3" cstate="print"/>
           <a:srcRect/>
           <a:stretch>
             <a:fillRect/>
@@ -20128,6 +20838,2974 @@
           </a:p>
         </p:txBody>
       </p:sp>
+      <p:sp>
+        <p:nvSpPr>
+          <p:cNvPr id="6" name="Rounded Rectangle 5"/>
+          <p:cNvSpPr/>
+          <p:nvPr/>
+        </p:nvSpPr>
+        <p:spPr>
+          <a:xfrm>
+            <a:off x="4625672" y="1387624"/>
+            <a:ext cx="3474720" cy="457200"/>
+          </a:xfrm>
+          <a:prstGeom prst="roundRect">
+            <a:avLst/>
+          </a:prstGeom>
+        </p:spPr>
+        <p:style>
+          <a:lnRef idx="2">
+            <a:schemeClr val="accent1"/>
+          </a:lnRef>
+          <a:fillRef idx="1">
+            <a:schemeClr val="lt1"/>
+          </a:fillRef>
+          <a:effectRef idx="0">
+            <a:schemeClr val="accent1"/>
+          </a:effectRef>
+          <a:fontRef idx="minor">
+            <a:schemeClr val="dk1"/>
+          </a:fontRef>
+        </p:style>
+        <p:txBody>
+          <a:bodyPr rtlCol="0" anchor="ctr"/>
+          <a:lstStyle/>
+          <a:p>
+            <a:pPr algn="ctr"/>
+            <a:r>
+              <a:rPr lang="es-CO" sz="1300" b="1" dirty="0" smtClean="0"/>
+              <a:t>Mantener nivel de servicio en condiciones de carga</a:t>
+            </a:r>
+            <a:endParaRPr lang="es-CO" sz="1300" b="1" dirty="0"/>
+          </a:p>
+        </p:txBody>
+      </p:sp>
+      <p:sp>
+        <p:nvSpPr>
+          <p:cNvPr id="8" name="Rounded Rectangle 7"/>
+          <p:cNvSpPr/>
+          <p:nvPr/>
+        </p:nvSpPr>
+        <p:spPr>
+          <a:xfrm>
+            <a:off x="4625672" y="1931684"/>
+            <a:ext cx="3474720" cy="457200"/>
+          </a:xfrm>
+          <a:prstGeom prst="roundRect">
+            <a:avLst/>
+          </a:prstGeom>
+        </p:spPr>
+        <p:style>
+          <a:lnRef idx="2">
+            <a:schemeClr val="accent1"/>
+          </a:lnRef>
+          <a:fillRef idx="1">
+            <a:schemeClr val="lt1"/>
+          </a:fillRef>
+          <a:effectRef idx="0">
+            <a:schemeClr val="accent1"/>
+          </a:effectRef>
+          <a:fontRef idx="minor">
+            <a:schemeClr val="dk1"/>
+          </a:fontRef>
+        </p:style>
+        <p:txBody>
+          <a:bodyPr rtlCol="0" anchor="ctr"/>
+          <a:lstStyle/>
+          <a:p>
+            <a:pPr algn="ctr"/>
+            <a:r>
+              <a:rPr lang="es-CO" sz="1300" b="1" dirty="0" smtClean="0"/>
+              <a:t>Alertar en máximo 1 segundo a las autoridades</a:t>
+            </a:r>
+            <a:endParaRPr lang="es-CO" sz="1300" b="1" dirty="0"/>
+          </a:p>
+        </p:txBody>
+      </p:sp>
+      <p:sp>
+        <p:nvSpPr>
+          <p:cNvPr id="9" name="Rounded Rectangle 8"/>
+          <p:cNvSpPr/>
+          <p:nvPr/>
+        </p:nvSpPr>
+        <p:spPr>
+          <a:xfrm>
+            <a:off x="4625672" y="2475744"/>
+            <a:ext cx="3474720" cy="457200"/>
+          </a:xfrm>
+          <a:prstGeom prst="roundRect">
+            <a:avLst/>
+          </a:prstGeom>
+        </p:spPr>
+        <p:style>
+          <a:lnRef idx="2">
+            <a:schemeClr val="accent1"/>
+          </a:lnRef>
+          <a:fillRef idx="1">
+            <a:schemeClr val="lt1"/>
+          </a:fillRef>
+          <a:effectRef idx="0">
+            <a:schemeClr val="accent1"/>
+          </a:effectRef>
+          <a:fontRef idx="minor">
+            <a:schemeClr val="dk1"/>
+          </a:fontRef>
+        </p:style>
+        <p:txBody>
+          <a:bodyPr rtlCol="0" anchor="ctr"/>
+          <a:lstStyle/>
+          <a:p>
+            <a:pPr algn="ctr"/>
+            <a:r>
+              <a:rPr lang="es-CO" sz="1300" b="1" dirty="0" smtClean="0"/>
+              <a:t>Se debe poder acceder reportes en un tiempo &lt;= 2s</a:t>
+            </a:r>
+            <a:endParaRPr lang="es-CO" sz="1300" b="1" dirty="0"/>
+          </a:p>
+        </p:txBody>
+      </p:sp>
+      <p:sp>
+        <p:nvSpPr>
+          <p:cNvPr id="10" name="Rounded Rectangle 9"/>
+          <p:cNvSpPr/>
+          <p:nvPr/>
+        </p:nvSpPr>
+        <p:spPr>
+          <a:xfrm>
+            <a:off x="4625672" y="3019804"/>
+            <a:ext cx="3474720" cy="457200"/>
+          </a:xfrm>
+          <a:prstGeom prst="roundRect">
+            <a:avLst/>
+          </a:prstGeom>
+        </p:spPr>
+        <p:style>
+          <a:lnRef idx="2">
+            <a:schemeClr val="accent1"/>
+          </a:lnRef>
+          <a:fillRef idx="1">
+            <a:schemeClr val="lt1"/>
+          </a:fillRef>
+          <a:effectRef idx="0">
+            <a:schemeClr val="accent1"/>
+          </a:effectRef>
+          <a:fontRef idx="minor">
+            <a:schemeClr val="dk1"/>
+          </a:fontRef>
+        </p:style>
+        <p:txBody>
+          <a:bodyPr rtlCol="0" anchor="ctr"/>
+          <a:lstStyle/>
+          <a:p>
+            <a:pPr algn="ctr"/>
+            <a:r>
+              <a:rPr lang="es-CO" sz="1300" b="1" dirty="0" smtClean="0"/>
+              <a:t>El sistema tarda máximo 2 segundos en registrar la falla de un sensor</a:t>
+            </a:r>
+            <a:endParaRPr lang="es-CO" sz="1300" b="1" dirty="0"/>
+          </a:p>
+        </p:txBody>
+      </p:sp>
+      <p:sp>
+        <p:nvSpPr>
+          <p:cNvPr id="11" name="Rounded Rectangle 10"/>
+          <p:cNvSpPr/>
+          <p:nvPr/>
+        </p:nvSpPr>
+        <p:spPr>
+          <a:xfrm>
+            <a:off x="4625672" y="3563864"/>
+            <a:ext cx="3474720" cy="457200"/>
+          </a:xfrm>
+          <a:prstGeom prst="roundRect">
+            <a:avLst/>
+          </a:prstGeom>
+        </p:spPr>
+        <p:style>
+          <a:lnRef idx="2">
+            <a:schemeClr val="accent1"/>
+          </a:lnRef>
+          <a:fillRef idx="1">
+            <a:schemeClr val="lt1"/>
+          </a:fillRef>
+          <a:effectRef idx="0">
+            <a:schemeClr val="accent1"/>
+          </a:effectRef>
+          <a:fontRef idx="minor">
+            <a:schemeClr val="dk1"/>
+          </a:fontRef>
+        </p:style>
+        <p:txBody>
+          <a:bodyPr rtlCol="0" anchor="ctr"/>
+          <a:lstStyle/>
+          <a:p>
+            <a:pPr algn="ctr"/>
+            <a:r>
+              <a:rPr lang="es-CO" sz="1300" b="1" dirty="0" smtClean="0"/>
+              <a:t>Ante un evento se debe proveer alertas en máximo 1 segundo</a:t>
+            </a:r>
+            <a:endParaRPr lang="es-CO" sz="1300" b="1" dirty="0"/>
+          </a:p>
+        </p:txBody>
+      </p:sp>
+      <p:sp>
+        <p:nvSpPr>
+          <p:cNvPr id="12" name="Rounded Rectangle 11"/>
+          <p:cNvSpPr/>
+          <p:nvPr/>
+        </p:nvSpPr>
+        <p:spPr>
+          <a:xfrm>
+            <a:off x="4625672" y="4107924"/>
+            <a:ext cx="3474720" cy="457200"/>
+          </a:xfrm>
+          <a:prstGeom prst="roundRect">
+            <a:avLst/>
+          </a:prstGeom>
+        </p:spPr>
+        <p:style>
+          <a:lnRef idx="2">
+            <a:schemeClr val="accent1"/>
+          </a:lnRef>
+          <a:fillRef idx="1">
+            <a:schemeClr val="lt1"/>
+          </a:fillRef>
+          <a:effectRef idx="0">
+            <a:schemeClr val="accent1"/>
+          </a:effectRef>
+          <a:fontRef idx="minor">
+            <a:schemeClr val="dk1"/>
+          </a:fontRef>
+        </p:style>
+        <p:txBody>
+          <a:bodyPr rtlCol="0" anchor="ctr"/>
+          <a:lstStyle/>
+          <a:p>
+            <a:pPr algn="ctr"/>
+            <a:r>
+              <a:rPr lang="es-CO" sz="1300" b="1" dirty="0" smtClean="0"/>
+              <a:t>Tener el 100% de las funcionalidades del propietario desde web y desde móvil</a:t>
+            </a:r>
+            <a:endParaRPr lang="es-CO" sz="1300" b="1" dirty="0"/>
+          </a:p>
+        </p:txBody>
+      </p:sp>
+      <p:sp>
+        <p:nvSpPr>
+          <p:cNvPr id="13" name="Rounded Rectangle 12"/>
+          <p:cNvSpPr/>
+          <p:nvPr/>
+        </p:nvSpPr>
+        <p:spPr>
+          <a:xfrm>
+            <a:off x="4625672" y="4651984"/>
+            <a:ext cx="3474720" cy="457200"/>
+          </a:xfrm>
+          <a:prstGeom prst="roundRect">
+            <a:avLst/>
+          </a:prstGeom>
+        </p:spPr>
+        <p:style>
+          <a:lnRef idx="2">
+            <a:schemeClr val="accent1"/>
+          </a:lnRef>
+          <a:fillRef idx="1">
+            <a:schemeClr val="lt1"/>
+          </a:fillRef>
+          <a:effectRef idx="0">
+            <a:schemeClr val="accent1"/>
+          </a:effectRef>
+          <a:fontRef idx="minor">
+            <a:schemeClr val="dk1"/>
+          </a:fontRef>
+        </p:style>
+        <p:txBody>
+          <a:bodyPr rtlCol="0" anchor="ctr"/>
+          <a:lstStyle/>
+          <a:p>
+            <a:pPr algn="ctr"/>
+            <a:r>
+              <a:rPr lang="es-CO" sz="1300" b="1" dirty="0" smtClean="0"/>
+              <a:t>El 100% de las consultas críticas deben ejecutarse correctamente</a:t>
+            </a:r>
+            <a:endParaRPr lang="es-CO" sz="1300" b="1" dirty="0"/>
+          </a:p>
+        </p:txBody>
+      </p:sp>
+      <p:sp>
+        <p:nvSpPr>
+          <p:cNvPr id="14" name="Rounded Rectangle 13"/>
+          <p:cNvSpPr/>
+          <p:nvPr/>
+        </p:nvSpPr>
+        <p:spPr>
+          <a:xfrm>
+            <a:off x="4625672" y="5196044"/>
+            <a:ext cx="3474720" cy="457200"/>
+          </a:xfrm>
+          <a:prstGeom prst="roundRect">
+            <a:avLst/>
+          </a:prstGeom>
+        </p:spPr>
+        <p:style>
+          <a:lnRef idx="2">
+            <a:schemeClr val="accent1"/>
+          </a:lnRef>
+          <a:fillRef idx="1">
+            <a:schemeClr val="lt1"/>
+          </a:fillRef>
+          <a:effectRef idx="0">
+            <a:schemeClr val="accent1"/>
+          </a:effectRef>
+          <a:fontRef idx="minor">
+            <a:schemeClr val="dk1"/>
+          </a:fontRef>
+        </p:style>
+        <p:txBody>
+          <a:bodyPr rtlCol="0" anchor="ctr"/>
+          <a:lstStyle/>
+          <a:p>
+            <a:pPr algn="ctr"/>
+            <a:r>
+              <a:rPr lang="es-CO" sz="1300" b="1" dirty="0" smtClean="0"/>
+              <a:t>Al menos el 99% de las veces se debe detectar que un elemento sale de su área asignada</a:t>
+            </a:r>
+            <a:endParaRPr lang="es-CO" sz="1300" b="1" dirty="0"/>
+          </a:p>
+        </p:txBody>
+      </p:sp>
+      <p:sp>
+        <p:nvSpPr>
+          <p:cNvPr id="17" name="Rounded Rectangle 16"/>
+          <p:cNvSpPr/>
+          <p:nvPr/>
+        </p:nvSpPr>
+        <p:spPr>
+          <a:xfrm>
+            <a:off x="4625672" y="5740104"/>
+            <a:ext cx="3474720" cy="457200"/>
+          </a:xfrm>
+          <a:prstGeom prst="roundRect">
+            <a:avLst/>
+          </a:prstGeom>
+        </p:spPr>
+        <p:style>
+          <a:lnRef idx="2">
+            <a:schemeClr val="accent1"/>
+          </a:lnRef>
+          <a:fillRef idx="1">
+            <a:schemeClr val="lt1"/>
+          </a:fillRef>
+          <a:effectRef idx="0">
+            <a:schemeClr val="accent1"/>
+          </a:effectRef>
+          <a:fontRef idx="minor">
+            <a:schemeClr val="dk1"/>
+          </a:fontRef>
+        </p:style>
+        <p:txBody>
+          <a:bodyPr rtlCol="0" anchor="ctr"/>
+          <a:lstStyle/>
+          <a:p>
+            <a:pPr algn="ctr"/>
+            <a:r>
+              <a:rPr lang="es-CO" sz="1300" b="1" dirty="0" smtClean="0"/>
+              <a:t>Soportar hasta 900 viviendas adicionales sin cambios en software</a:t>
+            </a:r>
+            <a:endParaRPr lang="es-CO" sz="1300" b="1" dirty="0"/>
+          </a:p>
+        </p:txBody>
+      </p:sp>
+      <p:sp>
+        <p:nvSpPr>
+          <p:cNvPr id="18" name="Rounded Rectangle 17"/>
+          <p:cNvSpPr/>
+          <p:nvPr/>
+        </p:nvSpPr>
+        <p:spPr>
+          <a:xfrm>
+            <a:off x="4625672" y="6284168"/>
+            <a:ext cx="3474720" cy="457200"/>
+          </a:xfrm>
+          <a:prstGeom prst="roundRect">
+            <a:avLst/>
+          </a:prstGeom>
+        </p:spPr>
+        <p:style>
+          <a:lnRef idx="2">
+            <a:schemeClr val="accent1"/>
+          </a:lnRef>
+          <a:fillRef idx="1">
+            <a:schemeClr val="lt1"/>
+          </a:fillRef>
+          <a:effectRef idx="0">
+            <a:schemeClr val="accent1"/>
+          </a:effectRef>
+          <a:fontRef idx="minor">
+            <a:schemeClr val="dk1"/>
+          </a:fontRef>
+        </p:style>
+        <p:txBody>
+          <a:bodyPr rtlCol="0" anchor="ctr"/>
+          <a:lstStyle/>
+          <a:p>
+            <a:pPr algn="ctr"/>
+            <a:r>
+              <a:rPr lang="es-CO" sz="1300" b="1" dirty="0" smtClean="0"/>
+              <a:t>El 100% de las consultas resultan la información correcta</a:t>
+            </a:r>
+            <a:endParaRPr lang="es-CO" sz="1300" b="1" dirty="0"/>
+          </a:p>
+        </p:txBody>
+      </p:sp>
+      <p:sp>
+        <p:nvSpPr>
+          <p:cNvPr id="41" name="TextBox 40"/>
+          <p:cNvSpPr txBox="1"/>
+          <p:nvPr/>
+        </p:nvSpPr>
+        <p:spPr>
+          <a:xfrm>
+            <a:off x="8172400" y="1407056"/>
+            <a:ext cx="365760" cy="365760"/>
+          </a:xfrm>
+          <a:prstGeom prst="ellipse">
+            <a:avLst/>
+          </a:prstGeom>
+        </p:spPr>
+        <p:style>
+          <a:lnRef idx="1">
+            <a:schemeClr val="accent1"/>
+          </a:lnRef>
+          <a:fillRef idx="3">
+            <a:schemeClr val="accent1"/>
+          </a:fillRef>
+          <a:effectRef idx="2">
+            <a:schemeClr val="accent1"/>
+          </a:effectRef>
+          <a:fontRef idx="minor">
+            <a:schemeClr val="lt1"/>
+          </a:fontRef>
+        </p:style>
+        <p:txBody>
+          <a:bodyPr wrap="square" rtlCol="0" anchor="ctr">
+            <a:spAutoFit/>
+          </a:bodyPr>
+          <a:lstStyle/>
+          <a:p>
+            <a:pPr algn="ctr"/>
+            <a:r>
+              <a:rPr lang="es-CO" b="1" dirty="0" smtClean="0">
+                <a:solidFill>
+                  <a:schemeClr val="bg1"/>
+                </a:solidFill>
+                <a:effectLst>
+                  <a:outerShdw blurRad="38100" dist="38100" dir="2700000" algn="tl">
+                    <a:srgbClr val="000000">
+                      <a:alpha val="43137"/>
+                    </a:srgbClr>
+                  </a:outerShdw>
+                </a:effectLst>
+              </a:rPr>
+              <a:t>M</a:t>
+            </a:r>
+            <a:endParaRPr lang="es-CO" b="1" dirty="0">
+              <a:solidFill>
+                <a:schemeClr val="bg1"/>
+              </a:solidFill>
+              <a:effectLst>
+                <a:outerShdw blurRad="38100" dist="38100" dir="2700000" algn="tl">
+                  <a:srgbClr val="000000">
+                    <a:alpha val="43137"/>
+                  </a:srgbClr>
+                </a:outerShdw>
+              </a:effectLst>
+            </a:endParaRPr>
+          </a:p>
+        </p:txBody>
+      </p:sp>
+      <p:sp>
+        <p:nvSpPr>
+          <p:cNvPr id="43" name="TextBox 42"/>
+          <p:cNvSpPr txBox="1"/>
+          <p:nvPr/>
+        </p:nvSpPr>
+        <p:spPr>
+          <a:xfrm>
+            <a:off x="8172400" y="3583296"/>
+            <a:ext cx="365760" cy="365760"/>
+          </a:xfrm>
+          <a:prstGeom prst="ellipse">
+            <a:avLst/>
+          </a:prstGeom>
+        </p:spPr>
+        <p:style>
+          <a:lnRef idx="1">
+            <a:schemeClr val="accent2"/>
+          </a:lnRef>
+          <a:fillRef idx="3">
+            <a:schemeClr val="accent2"/>
+          </a:fillRef>
+          <a:effectRef idx="2">
+            <a:schemeClr val="accent2"/>
+          </a:effectRef>
+          <a:fontRef idx="minor">
+            <a:schemeClr val="lt1"/>
+          </a:fontRef>
+        </p:style>
+        <p:txBody>
+          <a:bodyPr wrap="square" rtlCol="0" anchor="ctr">
+            <a:spAutoFit/>
+          </a:bodyPr>
+          <a:lstStyle/>
+          <a:p>
+            <a:pPr algn="ctr"/>
+            <a:r>
+              <a:rPr lang="es-CO" b="1" dirty="0" smtClean="0">
+                <a:solidFill>
+                  <a:schemeClr val="bg1"/>
+                </a:solidFill>
+                <a:effectLst>
+                  <a:outerShdw blurRad="38100" dist="38100" dir="2700000" algn="tl">
+                    <a:srgbClr val="000000">
+                      <a:alpha val="43137"/>
+                    </a:srgbClr>
+                  </a:outerShdw>
+                </a:effectLst>
+              </a:rPr>
+              <a:t>A</a:t>
+            </a:r>
+            <a:endParaRPr lang="es-CO" b="1" dirty="0">
+              <a:solidFill>
+                <a:schemeClr val="bg1"/>
+              </a:solidFill>
+              <a:effectLst>
+                <a:outerShdw blurRad="38100" dist="38100" dir="2700000" algn="tl">
+                  <a:srgbClr val="000000">
+                    <a:alpha val="43137"/>
+                  </a:srgbClr>
+                </a:outerShdw>
+              </a:effectLst>
+            </a:endParaRPr>
+          </a:p>
+        </p:txBody>
+      </p:sp>
+      <p:sp>
+        <p:nvSpPr>
+          <p:cNvPr id="45" name="TextBox 44"/>
+          <p:cNvSpPr txBox="1"/>
+          <p:nvPr/>
+        </p:nvSpPr>
+        <p:spPr>
+          <a:xfrm>
+            <a:off x="8172400" y="1951116"/>
+            <a:ext cx="365760" cy="365760"/>
+          </a:xfrm>
+          <a:prstGeom prst="ellipse">
+            <a:avLst/>
+          </a:prstGeom>
+        </p:spPr>
+        <p:style>
+          <a:lnRef idx="1">
+            <a:schemeClr val="accent2"/>
+          </a:lnRef>
+          <a:fillRef idx="3">
+            <a:schemeClr val="accent2"/>
+          </a:fillRef>
+          <a:effectRef idx="2">
+            <a:schemeClr val="accent2"/>
+          </a:effectRef>
+          <a:fontRef idx="minor">
+            <a:schemeClr val="lt1"/>
+          </a:fontRef>
+        </p:style>
+        <p:txBody>
+          <a:bodyPr wrap="square" rtlCol="0" anchor="ctr">
+            <a:spAutoFit/>
+          </a:bodyPr>
+          <a:lstStyle/>
+          <a:p>
+            <a:pPr algn="ctr"/>
+            <a:r>
+              <a:rPr lang="es-CO" b="1" dirty="0" smtClean="0">
+                <a:solidFill>
+                  <a:schemeClr val="bg1"/>
+                </a:solidFill>
+                <a:effectLst>
+                  <a:outerShdw blurRad="38100" dist="38100" dir="2700000" algn="tl">
+                    <a:srgbClr val="000000">
+                      <a:alpha val="43137"/>
+                    </a:srgbClr>
+                  </a:outerShdw>
+                </a:effectLst>
+              </a:rPr>
+              <a:t>A</a:t>
+            </a:r>
+            <a:endParaRPr lang="es-CO" b="1" dirty="0">
+              <a:solidFill>
+                <a:schemeClr val="bg1"/>
+              </a:solidFill>
+              <a:effectLst>
+                <a:outerShdw blurRad="38100" dist="38100" dir="2700000" algn="tl">
+                  <a:srgbClr val="000000">
+                    <a:alpha val="43137"/>
+                  </a:srgbClr>
+                </a:outerShdw>
+              </a:effectLst>
+            </a:endParaRPr>
+          </a:p>
+        </p:txBody>
+      </p:sp>
+      <p:sp>
+        <p:nvSpPr>
+          <p:cNvPr id="46" name="TextBox 45"/>
+          <p:cNvSpPr txBox="1"/>
+          <p:nvPr/>
+        </p:nvSpPr>
+        <p:spPr>
+          <a:xfrm>
+            <a:off x="8172400" y="4127356"/>
+            <a:ext cx="365760" cy="365760"/>
+          </a:xfrm>
+          <a:prstGeom prst="ellipse">
+            <a:avLst/>
+          </a:prstGeom>
+        </p:spPr>
+        <p:style>
+          <a:lnRef idx="1">
+            <a:schemeClr val="accent1"/>
+          </a:lnRef>
+          <a:fillRef idx="3">
+            <a:schemeClr val="accent1"/>
+          </a:fillRef>
+          <a:effectRef idx="2">
+            <a:schemeClr val="accent1"/>
+          </a:effectRef>
+          <a:fontRef idx="minor">
+            <a:schemeClr val="lt1"/>
+          </a:fontRef>
+        </p:style>
+        <p:txBody>
+          <a:bodyPr wrap="square" rtlCol="0" anchor="ctr">
+            <a:spAutoFit/>
+          </a:bodyPr>
+          <a:lstStyle/>
+          <a:p>
+            <a:pPr algn="ctr"/>
+            <a:r>
+              <a:rPr lang="es-CO" b="1" dirty="0" smtClean="0">
+                <a:solidFill>
+                  <a:schemeClr val="bg1"/>
+                </a:solidFill>
+                <a:effectLst>
+                  <a:outerShdw blurRad="38100" dist="38100" dir="2700000" algn="tl">
+                    <a:srgbClr val="000000">
+                      <a:alpha val="43137"/>
+                    </a:srgbClr>
+                  </a:outerShdw>
+                </a:effectLst>
+              </a:rPr>
+              <a:t>M</a:t>
+            </a:r>
+            <a:endParaRPr lang="es-CO" b="1" dirty="0">
+              <a:solidFill>
+                <a:schemeClr val="bg1"/>
+              </a:solidFill>
+              <a:effectLst>
+                <a:outerShdw blurRad="38100" dist="38100" dir="2700000" algn="tl">
+                  <a:srgbClr val="000000">
+                    <a:alpha val="43137"/>
+                  </a:srgbClr>
+                </a:outerShdw>
+              </a:effectLst>
+            </a:endParaRPr>
+          </a:p>
+        </p:txBody>
+      </p:sp>
+      <p:sp>
+        <p:nvSpPr>
+          <p:cNvPr id="47" name="TextBox 46"/>
+          <p:cNvSpPr txBox="1"/>
+          <p:nvPr/>
+        </p:nvSpPr>
+        <p:spPr>
+          <a:xfrm>
+            <a:off x="8172400" y="5759536"/>
+            <a:ext cx="365760" cy="365760"/>
+          </a:xfrm>
+          <a:prstGeom prst="ellipse">
+            <a:avLst/>
+          </a:prstGeom>
+        </p:spPr>
+        <p:style>
+          <a:lnRef idx="1">
+            <a:schemeClr val="accent1"/>
+          </a:lnRef>
+          <a:fillRef idx="3">
+            <a:schemeClr val="accent1"/>
+          </a:fillRef>
+          <a:effectRef idx="2">
+            <a:schemeClr val="accent1"/>
+          </a:effectRef>
+          <a:fontRef idx="minor">
+            <a:schemeClr val="lt1"/>
+          </a:fontRef>
+        </p:style>
+        <p:txBody>
+          <a:bodyPr wrap="square" rtlCol="0" anchor="ctr">
+            <a:spAutoFit/>
+          </a:bodyPr>
+          <a:lstStyle/>
+          <a:p>
+            <a:pPr algn="ctr"/>
+            <a:r>
+              <a:rPr lang="es-CO" b="1" dirty="0" smtClean="0">
+                <a:solidFill>
+                  <a:schemeClr val="bg1"/>
+                </a:solidFill>
+                <a:effectLst>
+                  <a:outerShdw blurRad="38100" dist="38100" dir="2700000" algn="tl">
+                    <a:srgbClr val="000000">
+                      <a:alpha val="43137"/>
+                    </a:srgbClr>
+                  </a:outerShdw>
+                </a:effectLst>
+              </a:rPr>
+              <a:t>M</a:t>
+            </a:r>
+            <a:endParaRPr lang="es-CO" b="1" dirty="0">
+              <a:solidFill>
+                <a:schemeClr val="bg1"/>
+              </a:solidFill>
+              <a:effectLst>
+                <a:outerShdw blurRad="38100" dist="38100" dir="2700000" algn="tl">
+                  <a:srgbClr val="000000">
+                    <a:alpha val="43137"/>
+                  </a:srgbClr>
+                </a:outerShdw>
+              </a:effectLst>
+            </a:endParaRPr>
+          </a:p>
+        </p:txBody>
+      </p:sp>
+      <p:sp>
+        <p:nvSpPr>
+          <p:cNvPr id="48" name="TextBox 47"/>
+          <p:cNvSpPr txBox="1"/>
+          <p:nvPr/>
+        </p:nvSpPr>
+        <p:spPr>
+          <a:xfrm>
+            <a:off x="8172400" y="6303600"/>
+            <a:ext cx="365760" cy="365760"/>
+          </a:xfrm>
+          <a:prstGeom prst="ellipse">
+            <a:avLst/>
+          </a:prstGeom>
+        </p:spPr>
+        <p:style>
+          <a:lnRef idx="1">
+            <a:schemeClr val="accent1"/>
+          </a:lnRef>
+          <a:fillRef idx="3">
+            <a:schemeClr val="accent1"/>
+          </a:fillRef>
+          <a:effectRef idx="2">
+            <a:schemeClr val="accent1"/>
+          </a:effectRef>
+          <a:fontRef idx="minor">
+            <a:schemeClr val="lt1"/>
+          </a:fontRef>
+        </p:style>
+        <p:txBody>
+          <a:bodyPr wrap="square" rtlCol="0" anchor="ctr">
+            <a:spAutoFit/>
+          </a:bodyPr>
+          <a:lstStyle/>
+          <a:p>
+            <a:pPr algn="ctr"/>
+            <a:r>
+              <a:rPr lang="es-CO" b="1" dirty="0" smtClean="0">
+                <a:solidFill>
+                  <a:schemeClr val="bg1"/>
+                </a:solidFill>
+                <a:effectLst>
+                  <a:outerShdw blurRad="38100" dist="38100" dir="2700000" algn="tl">
+                    <a:srgbClr val="000000">
+                      <a:alpha val="43137"/>
+                    </a:srgbClr>
+                  </a:outerShdw>
+                </a:effectLst>
+              </a:rPr>
+              <a:t>M</a:t>
+            </a:r>
+            <a:endParaRPr lang="es-CO" b="1" dirty="0">
+              <a:solidFill>
+                <a:schemeClr val="bg1"/>
+              </a:solidFill>
+              <a:effectLst>
+                <a:outerShdw blurRad="38100" dist="38100" dir="2700000" algn="tl">
+                  <a:srgbClr val="000000">
+                    <a:alpha val="43137"/>
+                  </a:srgbClr>
+                </a:outerShdw>
+              </a:effectLst>
+            </a:endParaRPr>
+          </a:p>
+        </p:txBody>
+      </p:sp>
+      <p:sp>
+        <p:nvSpPr>
+          <p:cNvPr id="49" name="TextBox 48"/>
+          <p:cNvSpPr txBox="1"/>
+          <p:nvPr/>
+        </p:nvSpPr>
+        <p:spPr>
+          <a:xfrm>
+            <a:off x="8172400" y="2495176"/>
+            <a:ext cx="365760" cy="365760"/>
+          </a:xfrm>
+          <a:prstGeom prst="ellipse">
+            <a:avLst/>
+          </a:prstGeom>
+        </p:spPr>
+        <p:style>
+          <a:lnRef idx="1">
+            <a:schemeClr val="accent1"/>
+          </a:lnRef>
+          <a:fillRef idx="3">
+            <a:schemeClr val="accent1"/>
+          </a:fillRef>
+          <a:effectRef idx="2">
+            <a:schemeClr val="accent1"/>
+          </a:effectRef>
+          <a:fontRef idx="minor">
+            <a:schemeClr val="lt1"/>
+          </a:fontRef>
+        </p:style>
+        <p:txBody>
+          <a:bodyPr wrap="square" rtlCol="0" anchor="ctr">
+            <a:spAutoFit/>
+          </a:bodyPr>
+          <a:lstStyle/>
+          <a:p>
+            <a:pPr algn="ctr"/>
+            <a:r>
+              <a:rPr lang="es-CO" b="1" dirty="0" smtClean="0">
+                <a:solidFill>
+                  <a:schemeClr val="bg1"/>
+                </a:solidFill>
+                <a:effectLst>
+                  <a:outerShdw blurRad="38100" dist="38100" dir="2700000" algn="tl">
+                    <a:srgbClr val="000000">
+                      <a:alpha val="43137"/>
+                    </a:srgbClr>
+                  </a:outerShdw>
+                </a:effectLst>
+              </a:rPr>
+              <a:t>M</a:t>
+            </a:r>
+            <a:endParaRPr lang="es-CO" b="1" dirty="0">
+              <a:solidFill>
+                <a:schemeClr val="bg1"/>
+              </a:solidFill>
+              <a:effectLst>
+                <a:outerShdw blurRad="38100" dist="38100" dir="2700000" algn="tl">
+                  <a:srgbClr val="000000">
+                    <a:alpha val="43137"/>
+                  </a:srgbClr>
+                </a:outerShdw>
+              </a:effectLst>
+            </a:endParaRPr>
+          </a:p>
+        </p:txBody>
+      </p:sp>
+      <p:sp>
+        <p:nvSpPr>
+          <p:cNvPr id="50" name="TextBox 49"/>
+          <p:cNvSpPr txBox="1"/>
+          <p:nvPr/>
+        </p:nvSpPr>
+        <p:spPr>
+          <a:xfrm>
+            <a:off x="8172400" y="4671416"/>
+            <a:ext cx="365760" cy="365760"/>
+          </a:xfrm>
+          <a:prstGeom prst="ellipse">
+            <a:avLst/>
+          </a:prstGeom>
+        </p:spPr>
+        <p:style>
+          <a:lnRef idx="1">
+            <a:schemeClr val="accent1"/>
+          </a:lnRef>
+          <a:fillRef idx="3">
+            <a:schemeClr val="accent1"/>
+          </a:fillRef>
+          <a:effectRef idx="2">
+            <a:schemeClr val="accent1"/>
+          </a:effectRef>
+          <a:fontRef idx="minor">
+            <a:schemeClr val="lt1"/>
+          </a:fontRef>
+        </p:style>
+        <p:txBody>
+          <a:bodyPr wrap="square" rtlCol="0" anchor="ctr">
+            <a:spAutoFit/>
+          </a:bodyPr>
+          <a:lstStyle/>
+          <a:p>
+            <a:pPr algn="ctr"/>
+            <a:r>
+              <a:rPr lang="es-CO" b="1" dirty="0" smtClean="0">
+                <a:solidFill>
+                  <a:schemeClr val="bg1"/>
+                </a:solidFill>
+                <a:effectLst>
+                  <a:outerShdw blurRad="38100" dist="38100" dir="2700000" algn="tl">
+                    <a:srgbClr val="000000">
+                      <a:alpha val="43137"/>
+                    </a:srgbClr>
+                  </a:outerShdw>
+                </a:effectLst>
+              </a:rPr>
+              <a:t>M</a:t>
+            </a:r>
+            <a:endParaRPr lang="es-CO" b="1" dirty="0">
+              <a:solidFill>
+                <a:schemeClr val="bg1"/>
+              </a:solidFill>
+              <a:effectLst>
+                <a:outerShdw blurRad="38100" dist="38100" dir="2700000" algn="tl">
+                  <a:srgbClr val="000000">
+                    <a:alpha val="43137"/>
+                  </a:srgbClr>
+                </a:outerShdw>
+              </a:effectLst>
+            </a:endParaRPr>
+          </a:p>
+        </p:txBody>
+      </p:sp>
+      <p:sp>
+        <p:nvSpPr>
+          <p:cNvPr id="51" name="TextBox 50"/>
+          <p:cNvSpPr txBox="1"/>
+          <p:nvPr/>
+        </p:nvSpPr>
+        <p:spPr>
+          <a:xfrm>
+            <a:off x="8172400" y="3039236"/>
+            <a:ext cx="365760" cy="365760"/>
+          </a:xfrm>
+          <a:prstGeom prst="ellipse">
+            <a:avLst/>
+          </a:prstGeom>
+        </p:spPr>
+        <p:style>
+          <a:lnRef idx="1">
+            <a:schemeClr val="accent1"/>
+          </a:lnRef>
+          <a:fillRef idx="3">
+            <a:schemeClr val="accent1"/>
+          </a:fillRef>
+          <a:effectRef idx="2">
+            <a:schemeClr val="accent1"/>
+          </a:effectRef>
+          <a:fontRef idx="minor">
+            <a:schemeClr val="lt1"/>
+          </a:fontRef>
+        </p:style>
+        <p:txBody>
+          <a:bodyPr wrap="square" rtlCol="0" anchor="ctr">
+            <a:spAutoFit/>
+          </a:bodyPr>
+          <a:lstStyle/>
+          <a:p>
+            <a:pPr algn="ctr"/>
+            <a:r>
+              <a:rPr lang="es-CO" b="1" dirty="0" smtClean="0">
+                <a:solidFill>
+                  <a:schemeClr val="bg1"/>
+                </a:solidFill>
+                <a:effectLst>
+                  <a:outerShdw blurRad="38100" dist="38100" dir="2700000" algn="tl">
+                    <a:srgbClr val="000000">
+                      <a:alpha val="43137"/>
+                    </a:srgbClr>
+                  </a:outerShdw>
+                </a:effectLst>
+              </a:rPr>
+              <a:t>M</a:t>
+            </a:r>
+            <a:endParaRPr lang="es-CO" b="1" dirty="0">
+              <a:solidFill>
+                <a:schemeClr val="bg1"/>
+              </a:solidFill>
+              <a:effectLst>
+                <a:outerShdw blurRad="38100" dist="38100" dir="2700000" algn="tl">
+                  <a:srgbClr val="000000">
+                    <a:alpha val="43137"/>
+                  </a:srgbClr>
+                </a:outerShdw>
+              </a:effectLst>
+            </a:endParaRPr>
+          </a:p>
+        </p:txBody>
+      </p:sp>
+      <p:sp>
+        <p:nvSpPr>
+          <p:cNvPr id="52" name="TextBox 51"/>
+          <p:cNvSpPr txBox="1"/>
+          <p:nvPr/>
+        </p:nvSpPr>
+        <p:spPr>
+          <a:xfrm>
+            <a:off x="8172400" y="5215476"/>
+            <a:ext cx="365760" cy="365760"/>
+          </a:xfrm>
+          <a:prstGeom prst="ellipse">
+            <a:avLst/>
+          </a:prstGeom>
+        </p:spPr>
+        <p:style>
+          <a:lnRef idx="1">
+            <a:schemeClr val="accent2"/>
+          </a:lnRef>
+          <a:fillRef idx="3">
+            <a:schemeClr val="accent2"/>
+          </a:fillRef>
+          <a:effectRef idx="2">
+            <a:schemeClr val="accent2"/>
+          </a:effectRef>
+          <a:fontRef idx="minor">
+            <a:schemeClr val="lt1"/>
+          </a:fontRef>
+        </p:style>
+        <p:txBody>
+          <a:bodyPr wrap="square" rtlCol="0" anchor="ctr">
+            <a:spAutoFit/>
+          </a:bodyPr>
+          <a:lstStyle/>
+          <a:p>
+            <a:pPr algn="ctr"/>
+            <a:r>
+              <a:rPr lang="es-CO" b="1" dirty="0" smtClean="0">
+                <a:solidFill>
+                  <a:schemeClr val="bg1"/>
+                </a:solidFill>
+                <a:effectLst>
+                  <a:outerShdw blurRad="38100" dist="38100" dir="2700000" algn="tl">
+                    <a:srgbClr val="000000">
+                      <a:alpha val="43137"/>
+                    </a:srgbClr>
+                  </a:outerShdw>
+                </a:effectLst>
+              </a:rPr>
+              <a:t>A</a:t>
+            </a:r>
+            <a:endParaRPr lang="es-CO" b="1" dirty="0">
+              <a:solidFill>
+                <a:schemeClr val="bg1"/>
+              </a:solidFill>
+              <a:effectLst>
+                <a:outerShdw blurRad="38100" dist="38100" dir="2700000" algn="tl">
+                  <a:srgbClr val="000000">
+                    <a:alpha val="43137"/>
+                  </a:srgbClr>
+                </a:outerShdw>
+              </a:effectLst>
+            </a:endParaRPr>
+          </a:p>
+        </p:txBody>
+      </p:sp>
+      <p:sp>
+        <p:nvSpPr>
+          <p:cNvPr id="54" name="Rounded Rectangle 53"/>
+          <p:cNvSpPr/>
+          <p:nvPr/>
+        </p:nvSpPr>
+        <p:spPr>
+          <a:xfrm>
+            <a:off x="8604448" y="980728"/>
+            <a:ext cx="360040" cy="360040"/>
+          </a:xfrm>
+          <a:prstGeom prst="roundRect">
+            <a:avLst/>
+          </a:prstGeom>
+        </p:spPr>
+        <p:style>
+          <a:lnRef idx="1">
+            <a:schemeClr val="dk1"/>
+          </a:lnRef>
+          <a:fillRef idx="2">
+            <a:schemeClr val="dk1"/>
+          </a:fillRef>
+          <a:effectRef idx="1">
+            <a:schemeClr val="dk1"/>
+          </a:effectRef>
+          <a:fontRef idx="minor">
+            <a:schemeClr val="dk1"/>
+          </a:fontRef>
+        </p:style>
+        <p:txBody>
+          <a:bodyPr rtlCol="0" anchor="t"/>
+          <a:lstStyle/>
+          <a:p>
+            <a:pPr algn="ctr"/>
+            <a:r>
+              <a:rPr lang="es-CO" sz="1600" b="1" dirty="0" smtClean="0">
+                <a:effectLst>
+                  <a:outerShdw blurRad="38100" dist="38100" dir="2700000" algn="tl">
+                    <a:srgbClr val="000000">
+                      <a:alpha val="43137"/>
+                    </a:srgbClr>
+                  </a:outerShdw>
+                </a:effectLst>
+              </a:rPr>
+              <a:t>A</a:t>
+            </a:r>
+            <a:endParaRPr lang="es-CO" sz="1600" b="1" dirty="0">
+              <a:effectLst>
+                <a:outerShdw blurRad="38100" dist="38100" dir="2700000" algn="tl">
+                  <a:srgbClr val="000000">
+                    <a:alpha val="43137"/>
+                  </a:srgbClr>
+                </a:outerShdw>
+              </a:effectLst>
+            </a:endParaRPr>
+          </a:p>
+        </p:txBody>
+      </p:sp>
+      <p:sp>
+        <p:nvSpPr>
+          <p:cNvPr id="55" name="TextBox 54"/>
+          <p:cNvSpPr txBox="1"/>
+          <p:nvPr/>
+        </p:nvSpPr>
+        <p:spPr>
+          <a:xfrm>
+            <a:off x="8604448" y="1407056"/>
+            <a:ext cx="365760" cy="365760"/>
+          </a:xfrm>
+          <a:prstGeom prst="ellipse">
+            <a:avLst/>
+          </a:prstGeom>
+        </p:spPr>
+        <p:style>
+          <a:lnRef idx="1">
+            <a:schemeClr val="accent2"/>
+          </a:lnRef>
+          <a:fillRef idx="3">
+            <a:schemeClr val="accent2"/>
+          </a:fillRef>
+          <a:effectRef idx="2">
+            <a:schemeClr val="accent2"/>
+          </a:effectRef>
+          <a:fontRef idx="minor">
+            <a:schemeClr val="lt1"/>
+          </a:fontRef>
+        </p:style>
+        <p:txBody>
+          <a:bodyPr wrap="square" rtlCol="0" anchor="ctr">
+            <a:spAutoFit/>
+          </a:bodyPr>
+          <a:lstStyle/>
+          <a:p>
+            <a:pPr algn="ctr"/>
+            <a:r>
+              <a:rPr lang="es-CO" b="1" dirty="0" smtClean="0">
+                <a:solidFill>
+                  <a:schemeClr val="bg1"/>
+                </a:solidFill>
+                <a:effectLst>
+                  <a:outerShdw blurRad="38100" dist="38100" dir="2700000" algn="tl">
+                    <a:srgbClr val="000000">
+                      <a:alpha val="43137"/>
+                    </a:srgbClr>
+                  </a:outerShdw>
+                </a:effectLst>
+              </a:rPr>
+              <a:t>A</a:t>
+            </a:r>
+            <a:endParaRPr lang="es-CO" b="1" dirty="0">
+              <a:solidFill>
+                <a:schemeClr val="bg1"/>
+              </a:solidFill>
+              <a:effectLst>
+                <a:outerShdw blurRad="38100" dist="38100" dir="2700000" algn="tl">
+                  <a:srgbClr val="000000">
+                    <a:alpha val="43137"/>
+                  </a:srgbClr>
+                </a:outerShdw>
+              </a:effectLst>
+            </a:endParaRPr>
+          </a:p>
+        </p:txBody>
+      </p:sp>
+      <p:sp>
+        <p:nvSpPr>
+          <p:cNvPr id="56" name="TextBox 55"/>
+          <p:cNvSpPr txBox="1"/>
+          <p:nvPr/>
+        </p:nvSpPr>
+        <p:spPr>
+          <a:xfrm>
+            <a:off x="8604448" y="3583296"/>
+            <a:ext cx="365760" cy="365760"/>
+          </a:xfrm>
+          <a:prstGeom prst="ellipse">
+            <a:avLst/>
+          </a:prstGeom>
+        </p:spPr>
+        <p:style>
+          <a:lnRef idx="1">
+            <a:schemeClr val="accent2"/>
+          </a:lnRef>
+          <a:fillRef idx="3">
+            <a:schemeClr val="accent2"/>
+          </a:fillRef>
+          <a:effectRef idx="2">
+            <a:schemeClr val="accent2"/>
+          </a:effectRef>
+          <a:fontRef idx="minor">
+            <a:schemeClr val="lt1"/>
+          </a:fontRef>
+        </p:style>
+        <p:txBody>
+          <a:bodyPr wrap="square" rtlCol="0" anchor="ctr">
+            <a:spAutoFit/>
+          </a:bodyPr>
+          <a:lstStyle/>
+          <a:p>
+            <a:pPr algn="ctr"/>
+            <a:r>
+              <a:rPr lang="es-CO" b="1" dirty="0" smtClean="0">
+                <a:solidFill>
+                  <a:schemeClr val="bg1"/>
+                </a:solidFill>
+                <a:effectLst>
+                  <a:outerShdw blurRad="38100" dist="38100" dir="2700000" algn="tl">
+                    <a:srgbClr val="000000">
+                      <a:alpha val="43137"/>
+                    </a:srgbClr>
+                  </a:outerShdw>
+                </a:effectLst>
+              </a:rPr>
+              <a:t>A</a:t>
+            </a:r>
+            <a:endParaRPr lang="es-CO" b="1" dirty="0">
+              <a:solidFill>
+                <a:schemeClr val="bg1"/>
+              </a:solidFill>
+              <a:effectLst>
+                <a:outerShdw blurRad="38100" dist="38100" dir="2700000" algn="tl">
+                  <a:srgbClr val="000000">
+                    <a:alpha val="43137"/>
+                  </a:srgbClr>
+                </a:outerShdw>
+              </a:effectLst>
+            </a:endParaRPr>
+          </a:p>
+        </p:txBody>
+      </p:sp>
+      <p:sp>
+        <p:nvSpPr>
+          <p:cNvPr id="57" name="TextBox 56"/>
+          <p:cNvSpPr txBox="1"/>
+          <p:nvPr/>
+        </p:nvSpPr>
+        <p:spPr>
+          <a:xfrm>
+            <a:off x="8604448" y="1951116"/>
+            <a:ext cx="365760" cy="365760"/>
+          </a:xfrm>
+          <a:prstGeom prst="ellipse">
+            <a:avLst/>
+          </a:prstGeom>
+        </p:spPr>
+        <p:style>
+          <a:lnRef idx="1">
+            <a:schemeClr val="accent2"/>
+          </a:lnRef>
+          <a:fillRef idx="3">
+            <a:schemeClr val="accent2"/>
+          </a:fillRef>
+          <a:effectRef idx="2">
+            <a:schemeClr val="accent2"/>
+          </a:effectRef>
+          <a:fontRef idx="minor">
+            <a:schemeClr val="lt1"/>
+          </a:fontRef>
+        </p:style>
+        <p:txBody>
+          <a:bodyPr wrap="square" rtlCol="0" anchor="ctr">
+            <a:spAutoFit/>
+          </a:bodyPr>
+          <a:lstStyle/>
+          <a:p>
+            <a:pPr algn="ctr"/>
+            <a:r>
+              <a:rPr lang="es-CO" b="1" dirty="0" smtClean="0">
+                <a:solidFill>
+                  <a:schemeClr val="bg1"/>
+                </a:solidFill>
+                <a:effectLst>
+                  <a:outerShdw blurRad="38100" dist="38100" dir="2700000" algn="tl">
+                    <a:srgbClr val="000000">
+                      <a:alpha val="43137"/>
+                    </a:srgbClr>
+                  </a:outerShdw>
+                </a:effectLst>
+              </a:rPr>
+              <a:t>A</a:t>
+            </a:r>
+            <a:endParaRPr lang="es-CO" b="1" dirty="0">
+              <a:solidFill>
+                <a:schemeClr val="bg1"/>
+              </a:solidFill>
+              <a:effectLst>
+                <a:outerShdw blurRad="38100" dist="38100" dir="2700000" algn="tl">
+                  <a:srgbClr val="000000">
+                    <a:alpha val="43137"/>
+                  </a:srgbClr>
+                </a:outerShdw>
+              </a:effectLst>
+            </a:endParaRPr>
+          </a:p>
+        </p:txBody>
+      </p:sp>
+      <p:sp>
+        <p:nvSpPr>
+          <p:cNvPr id="58" name="TextBox 57"/>
+          <p:cNvSpPr txBox="1"/>
+          <p:nvPr/>
+        </p:nvSpPr>
+        <p:spPr>
+          <a:xfrm>
+            <a:off x="8604448" y="4127356"/>
+            <a:ext cx="365760" cy="365760"/>
+          </a:xfrm>
+          <a:prstGeom prst="ellipse">
+            <a:avLst/>
+          </a:prstGeom>
+        </p:spPr>
+        <p:style>
+          <a:lnRef idx="1">
+            <a:schemeClr val="accent2"/>
+          </a:lnRef>
+          <a:fillRef idx="3">
+            <a:schemeClr val="accent2"/>
+          </a:fillRef>
+          <a:effectRef idx="2">
+            <a:schemeClr val="accent2"/>
+          </a:effectRef>
+          <a:fontRef idx="minor">
+            <a:schemeClr val="lt1"/>
+          </a:fontRef>
+        </p:style>
+        <p:txBody>
+          <a:bodyPr wrap="square" rtlCol="0" anchor="ctr">
+            <a:spAutoFit/>
+          </a:bodyPr>
+          <a:lstStyle/>
+          <a:p>
+            <a:pPr algn="ctr"/>
+            <a:r>
+              <a:rPr lang="es-CO" b="1" dirty="0" smtClean="0">
+                <a:solidFill>
+                  <a:schemeClr val="bg1"/>
+                </a:solidFill>
+                <a:effectLst>
+                  <a:outerShdw blurRad="38100" dist="38100" dir="2700000" algn="tl">
+                    <a:srgbClr val="000000">
+                      <a:alpha val="43137"/>
+                    </a:srgbClr>
+                  </a:outerShdw>
+                </a:effectLst>
+              </a:rPr>
+              <a:t>A</a:t>
+            </a:r>
+            <a:endParaRPr lang="es-CO" b="1" dirty="0">
+              <a:solidFill>
+                <a:schemeClr val="bg1"/>
+              </a:solidFill>
+              <a:effectLst>
+                <a:outerShdw blurRad="38100" dist="38100" dir="2700000" algn="tl">
+                  <a:srgbClr val="000000">
+                    <a:alpha val="43137"/>
+                  </a:srgbClr>
+                </a:outerShdw>
+              </a:effectLst>
+            </a:endParaRPr>
+          </a:p>
+        </p:txBody>
+      </p:sp>
+      <p:sp>
+        <p:nvSpPr>
+          <p:cNvPr id="59" name="TextBox 58"/>
+          <p:cNvSpPr txBox="1"/>
+          <p:nvPr/>
+        </p:nvSpPr>
+        <p:spPr>
+          <a:xfrm>
+            <a:off x="8604448" y="5759536"/>
+            <a:ext cx="365760" cy="365760"/>
+          </a:xfrm>
+          <a:prstGeom prst="ellipse">
+            <a:avLst/>
+          </a:prstGeom>
+        </p:spPr>
+        <p:style>
+          <a:lnRef idx="1">
+            <a:schemeClr val="accent2"/>
+          </a:lnRef>
+          <a:fillRef idx="3">
+            <a:schemeClr val="accent2"/>
+          </a:fillRef>
+          <a:effectRef idx="2">
+            <a:schemeClr val="accent2"/>
+          </a:effectRef>
+          <a:fontRef idx="minor">
+            <a:schemeClr val="lt1"/>
+          </a:fontRef>
+        </p:style>
+        <p:txBody>
+          <a:bodyPr wrap="square" rtlCol="0" anchor="ctr">
+            <a:spAutoFit/>
+          </a:bodyPr>
+          <a:lstStyle/>
+          <a:p>
+            <a:pPr algn="ctr"/>
+            <a:r>
+              <a:rPr lang="es-CO" b="1" dirty="0" smtClean="0">
+                <a:solidFill>
+                  <a:schemeClr val="bg1"/>
+                </a:solidFill>
+                <a:effectLst>
+                  <a:outerShdw blurRad="38100" dist="38100" dir="2700000" algn="tl">
+                    <a:srgbClr val="000000">
+                      <a:alpha val="43137"/>
+                    </a:srgbClr>
+                  </a:outerShdw>
+                </a:effectLst>
+              </a:rPr>
+              <a:t>A</a:t>
+            </a:r>
+            <a:endParaRPr lang="es-CO" b="1" dirty="0">
+              <a:solidFill>
+                <a:schemeClr val="bg1"/>
+              </a:solidFill>
+              <a:effectLst>
+                <a:outerShdw blurRad="38100" dist="38100" dir="2700000" algn="tl">
+                  <a:srgbClr val="000000">
+                    <a:alpha val="43137"/>
+                  </a:srgbClr>
+                </a:outerShdw>
+              </a:effectLst>
+            </a:endParaRPr>
+          </a:p>
+        </p:txBody>
+      </p:sp>
+      <p:sp>
+        <p:nvSpPr>
+          <p:cNvPr id="60" name="TextBox 59"/>
+          <p:cNvSpPr txBox="1"/>
+          <p:nvPr/>
+        </p:nvSpPr>
+        <p:spPr>
+          <a:xfrm>
+            <a:off x="8604448" y="6303600"/>
+            <a:ext cx="365760" cy="365760"/>
+          </a:xfrm>
+          <a:prstGeom prst="ellipse">
+            <a:avLst/>
+          </a:prstGeom>
+        </p:spPr>
+        <p:style>
+          <a:lnRef idx="1">
+            <a:schemeClr val="accent2"/>
+          </a:lnRef>
+          <a:fillRef idx="3">
+            <a:schemeClr val="accent2"/>
+          </a:fillRef>
+          <a:effectRef idx="2">
+            <a:schemeClr val="accent2"/>
+          </a:effectRef>
+          <a:fontRef idx="minor">
+            <a:schemeClr val="lt1"/>
+          </a:fontRef>
+        </p:style>
+        <p:txBody>
+          <a:bodyPr wrap="square" rtlCol="0" anchor="ctr">
+            <a:spAutoFit/>
+          </a:bodyPr>
+          <a:lstStyle/>
+          <a:p>
+            <a:pPr algn="ctr"/>
+            <a:r>
+              <a:rPr lang="es-CO" b="1" dirty="0" smtClean="0">
+                <a:solidFill>
+                  <a:schemeClr val="bg1"/>
+                </a:solidFill>
+                <a:effectLst>
+                  <a:outerShdw blurRad="38100" dist="38100" dir="2700000" algn="tl">
+                    <a:srgbClr val="000000">
+                      <a:alpha val="43137"/>
+                    </a:srgbClr>
+                  </a:outerShdw>
+                </a:effectLst>
+              </a:rPr>
+              <a:t>A</a:t>
+            </a:r>
+            <a:endParaRPr lang="es-CO" b="1" dirty="0">
+              <a:solidFill>
+                <a:schemeClr val="bg1"/>
+              </a:solidFill>
+              <a:effectLst>
+                <a:outerShdw blurRad="38100" dist="38100" dir="2700000" algn="tl">
+                  <a:srgbClr val="000000">
+                    <a:alpha val="43137"/>
+                  </a:srgbClr>
+                </a:outerShdw>
+              </a:effectLst>
+            </a:endParaRPr>
+          </a:p>
+        </p:txBody>
+      </p:sp>
+      <p:sp>
+        <p:nvSpPr>
+          <p:cNvPr id="61" name="TextBox 60"/>
+          <p:cNvSpPr txBox="1"/>
+          <p:nvPr/>
+        </p:nvSpPr>
+        <p:spPr>
+          <a:xfrm>
+            <a:off x="8604448" y="2495176"/>
+            <a:ext cx="365760" cy="365760"/>
+          </a:xfrm>
+          <a:prstGeom prst="ellipse">
+            <a:avLst/>
+          </a:prstGeom>
+        </p:spPr>
+        <p:style>
+          <a:lnRef idx="1">
+            <a:schemeClr val="accent1"/>
+          </a:lnRef>
+          <a:fillRef idx="3">
+            <a:schemeClr val="accent1"/>
+          </a:fillRef>
+          <a:effectRef idx="2">
+            <a:schemeClr val="accent1"/>
+          </a:effectRef>
+          <a:fontRef idx="minor">
+            <a:schemeClr val="lt1"/>
+          </a:fontRef>
+        </p:style>
+        <p:txBody>
+          <a:bodyPr wrap="square" rtlCol="0" anchor="ctr">
+            <a:spAutoFit/>
+          </a:bodyPr>
+          <a:lstStyle/>
+          <a:p>
+            <a:pPr algn="ctr"/>
+            <a:r>
+              <a:rPr lang="es-CO" b="1" dirty="0" smtClean="0">
+                <a:solidFill>
+                  <a:schemeClr val="bg1"/>
+                </a:solidFill>
+                <a:effectLst>
+                  <a:outerShdw blurRad="38100" dist="38100" dir="2700000" algn="tl">
+                    <a:srgbClr val="000000">
+                      <a:alpha val="43137"/>
+                    </a:srgbClr>
+                  </a:outerShdw>
+                </a:effectLst>
+              </a:rPr>
+              <a:t>M</a:t>
+            </a:r>
+            <a:endParaRPr lang="es-CO" b="1" dirty="0">
+              <a:solidFill>
+                <a:schemeClr val="bg1"/>
+              </a:solidFill>
+              <a:effectLst>
+                <a:outerShdw blurRad="38100" dist="38100" dir="2700000" algn="tl">
+                  <a:srgbClr val="000000">
+                    <a:alpha val="43137"/>
+                  </a:srgbClr>
+                </a:outerShdw>
+              </a:effectLst>
+            </a:endParaRPr>
+          </a:p>
+        </p:txBody>
+      </p:sp>
+      <p:sp>
+        <p:nvSpPr>
+          <p:cNvPr id="62" name="TextBox 61"/>
+          <p:cNvSpPr txBox="1"/>
+          <p:nvPr/>
+        </p:nvSpPr>
+        <p:spPr>
+          <a:xfrm>
+            <a:off x="8604448" y="4671416"/>
+            <a:ext cx="365760" cy="365760"/>
+          </a:xfrm>
+          <a:prstGeom prst="ellipse">
+            <a:avLst/>
+          </a:prstGeom>
+        </p:spPr>
+        <p:style>
+          <a:lnRef idx="1">
+            <a:schemeClr val="accent1"/>
+          </a:lnRef>
+          <a:fillRef idx="3">
+            <a:schemeClr val="accent1"/>
+          </a:fillRef>
+          <a:effectRef idx="2">
+            <a:schemeClr val="accent1"/>
+          </a:effectRef>
+          <a:fontRef idx="minor">
+            <a:schemeClr val="lt1"/>
+          </a:fontRef>
+        </p:style>
+        <p:txBody>
+          <a:bodyPr wrap="square" rtlCol="0" anchor="ctr">
+            <a:spAutoFit/>
+          </a:bodyPr>
+          <a:lstStyle/>
+          <a:p>
+            <a:pPr algn="ctr"/>
+            <a:r>
+              <a:rPr lang="es-CO" b="1" dirty="0" smtClean="0">
+                <a:solidFill>
+                  <a:schemeClr val="bg1"/>
+                </a:solidFill>
+                <a:effectLst>
+                  <a:outerShdw blurRad="38100" dist="38100" dir="2700000" algn="tl">
+                    <a:srgbClr val="000000">
+                      <a:alpha val="43137"/>
+                    </a:srgbClr>
+                  </a:outerShdw>
+                </a:effectLst>
+              </a:rPr>
+              <a:t>M</a:t>
+            </a:r>
+            <a:endParaRPr lang="es-CO" b="1" dirty="0">
+              <a:solidFill>
+                <a:schemeClr val="bg1"/>
+              </a:solidFill>
+              <a:effectLst>
+                <a:outerShdw blurRad="38100" dist="38100" dir="2700000" algn="tl">
+                  <a:srgbClr val="000000">
+                    <a:alpha val="43137"/>
+                  </a:srgbClr>
+                </a:outerShdw>
+              </a:effectLst>
+            </a:endParaRPr>
+          </a:p>
+        </p:txBody>
+      </p:sp>
+      <p:sp>
+        <p:nvSpPr>
+          <p:cNvPr id="63" name="TextBox 62"/>
+          <p:cNvSpPr txBox="1"/>
+          <p:nvPr/>
+        </p:nvSpPr>
+        <p:spPr>
+          <a:xfrm>
+            <a:off x="8604448" y="3039236"/>
+            <a:ext cx="365760" cy="365760"/>
+          </a:xfrm>
+          <a:prstGeom prst="ellipse">
+            <a:avLst/>
+          </a:prstGeom>
+        </p:spPr>
+        <p:style>
+          <a:lnRef idx="1">
+            <a:schemeClr val="accent2"/>
+          </a:lnRef>
+          <a:fillRef idx="3">
+            <a:schemeClr val="accent2"/>
+          </a:fillRef>
+          <a:effectRef idx="2">
+            <a:schemeClr val="accent2"/>
+          </a:effectRef>
+          <a:fontRef idx="minor">
+            <a:schemeClr val="lt1"/>
+          </a:fontRef>
+        </p:style>
+        <p:txBody>
+          <a:bodyPr wrap="square" rtlCol="0" anchor="ctr">
+            <a:spAutoFit/>
+          </a:bodyPr>
+          <a:lstStyle/>
+          <a:p>
+            <a:pPr algn="ctr"/>
+            <a:r>
+              <a:rPr lang="es-CO" b="1" dirty="0" smtClean="0">
+                <a:solidFill>
+                  <a:schemeClr val="bg1"/>
+                </a:solidFill>
+                <a:effectLst>
+                  <a:outerShdw blurRad="38100" dist="38100" dir="2700000" algn="tl">
+                    <a:srgbClr val="000000">
+                      <a:alpha val="43137"/>
+                    </a:srgbClr>
+                  </a:outerShdw>
+                </a:effectLst>
+              </a:rPr>
+              <a:t>A</a:t>
+            </a:r>
+            <a:endParaRPr lang="es-CO" b="1" dirty="0">
+              <a:solidFill>
+                <a:schemeClr val="bg1"/>
+              </a:solidFill>
+              <a:effectLst>
+                <a:outerShdw blurRad="38100" dist="38100" dir="2700000" algn="tl">
+                  <a:srgbClr val="000000">
+                    <a:alpha val="43137"/>
+                  </a:srgbClr>
+                </a:outerShdw>
+              </a:effectLst>
+            </a:endParaRPr>
+          </a:p>
+        </p:txBody>
+      </p:sp>
+      <p:sp>
+        <p:nvSpPr>
+          <p:cNvPr id="64" name="TextBox 63"/>
+          <p:cNvSpPr txBox="1"/>
+          <p:nvPr/>
+        </p:nvSpPr>
+        <p:spPr>
+          <a:xfrm>
+            <a:off x="8604448" y="5215476"/>
+            <a:ext cx="365760" cy="365760"/>
+          </a:xfrm>
+          <a:prstGeom prst="ellipse">
+            <a:avLst/>
+          </a:prstGeom>
+        </p:spPr>
+        <p:style>
+          <a:lnRef idx="1">
+            <a:schemeClr val="accent1"/>
+          </a:lnRef>
+          <a:fillRef idx="3">
+            <a:schemeClr val="accent1"/>
+          </a:fillRef>
+          <a:effectRef idx="2">
+            <a:schemeClr val="accent1"/>
+          </a:effectRef>
+          <a:fontRef idx="minor">
+            <a:schemeClr val="lt1"/>
+          </a:fontRef>
+        </p:style>
+        <p:txBody>
+          <a:bodyPr wrap="square" rtlCol="0" anchor="ctr">
+            <a:spAutoFit/>
+          </a:bodyPr>
+          <a:lstStyle/>
+          <a:p>
+            <a:pPr algn="ctr"/>
+            <a:r>
+              <a:rPr lang="es-CO" b="1" dirty="0" smtClean="0">
+                <a:solidFill>
+                  <a:schemeClr val="bg1"/>
+                </a:solidFill>
+                <a:effectLst>
+                  <a:outerShdw blurRad="38100" dist="38100" dir="2700000" algn="tl">
+                    <a:srgbClr val="000000">
+                      <a:alpha val="43137"/>
+                    </a:srgbClr>
+                  </a:outerShdw>
+                </a:effectLst>
+              </a:rPr>
+              <a:t>M</a:t>
+            </a:r>
+            <a:endParaRPr lang="es-CO" b="1" dirty="0">
+              <a:solidFill>
+                <a:schemeClr val="bg1"/>
+              </a:solidFill>
+              <a:effectLst>
+                <a:outerShdw blurRad="38100" dist="38100" dir="2700000" algn="tl">
+                  <a:srgbClr val="000000">
+                    <a:alpha val="43137"/>
+                  </a:srgbClr>
+                </a:outerShdw>
+              </a:effectLst>
+            </a:endParaRPr>
+          </a:p>
+        </p:txBody>
+      </p:sp>
+      <p:sp>
+        <p:nvSpPr>
+          <p:cNvPr id="65" name="Rounded Rectangle 64"/>
+          <p:cNvSpPr/>
+          <p:nvPr/>
+        </p:nvSpPr>
+        <p:spPr>
+          <a:xfrm>
+            <a:off x="2388880" y="1407056"/>
+            <a:ext cx="1463040" cy="365760"/>
+          </a:xfrm>
+          <a:prstGeom prst="roundRect">
+            <a:avLst/>
+          </a:prstGeom>
+        </p:spPr>
+        <p:style>
+          <a:lnRef idx="2">
+            <a:schemeClr val="accent1"/>
+          </a:lnRef>
+          <a:fillRef idx="1">
+            <a:schemeClr val="lt1"/>
+          </a:fillRef>
+          <a:effectRef idx="0">
+            <a:schemeClr val="accent1"/>
+          </a:effectRef>
+          <a:fontRef idx="minor">
+            <a:schemeClr val="dk1"/>
+          </a:fontRef>
+        </p:style>
+        <p:txBody>
+          <a:bodyPr rtlCol="0" anchor="ctr"/>
+          <a:lstStyle/>
+          <a:p>
+            <a:pPr algn="ctr"/>
+            <a:r>
+              <a:rPr lang="es-CO" sz="1400" b="1" dirty="0" err="1" smtClean="0"/>
+              <a:t>Jitter</a:t>
+            </a:r>
+            <a:endParaRPr lang="es-CO" sz="1400" b="1" dirty="0"/>
+          </a:p>
+        </p:txBody>
+      </p:sp>
+      <p:sp>
+        <p:nvSpPr>
+          <p:cNvPr id="66" name="Rounded Rectangle 65"/>
+          <p:cNvSpPr/>
+          <p:nvPr/>
+        </p:nvSpPr>
+        <p:spPr>
+          <a:xfrm>
+            <a:off x="2388880" y="2775208"/>
+            <a:ext cx="1463040" cy="365760"/>
+          </a:xfrm>
+          <a:prstGeom prst="roundRect">
+            <a:avLst/>
+          </a:prstGeom>
+        </p:spPr>
+        <p:style>
+          <a:lnRef idx="2">
+            <a:schemeClr val="accent1"/>
+          </a:lnRef>
+          <a:fillRef idx="1">
+            <a:schemeClr val="lt1"/>
+          </a:fillRef>
+          <a:effectRef idx="0">
+            <a:schemeClr val="accent1"/>
+          </a:effectRef>
+          <a:fontRef idx="minor">
+            <a:schemeClr val="dk1"/>
+          </a:fontRef>
+        </p:style>
+        <p:txBody>
+          <a:bodyPr rtlCol="0" anchor="ctr"/>
+          <a:lstStyle/>
+          <a:p>
+            <a:pPr algn="ctr"/>
+            <a:r>
+              <a:rPr lang="es-CO" sz="1400" b="1" dirty="0" smtClean="0"/>
+              <a:t>Latencia</a:t>
+            </a:r>
+            <a:endParaRPr lang="es-CO" sz="1400" b="1" dirty="0"/>
+          </a:p>
+        </p:txBody>
+      </p:sp>
+      <p:sp>
+        <p:nvSpPr>
+          <p:cNvPr id="67" name="Rounded Rectangle 66"/>
+          <p:cNvSpPr/>
+          <p:nvPr/>
+        </p:nvSpPr>
+        <p:spPr>
+          <a:xfrm>
+            <a:off x="2388880" y="4135358"/>
+            <a:ext cx="1463040" cy="365760"/>
+          </a:xfrm>
+          <a:prstGeom prst="roundRect">
+            <a:avLst/>
+          </a:prstGeom>
+        </p:spPr>
+        <p:style>
+          <a:lnRef idx="2">
+            <a:schemeClr val="accent1"/>
+          </a:lnRef>
+          <a:fillRef idx="1">
+            <a:schemeClr val="lt1"/>
+          </a:fillRef>
+          <a:effectRef idx="0">
+            <a:schemeClr val="accent1"/>
+          </a:effectRef>
+          <a:fontRef idx="minor">
+            <a:schemeClr val="dk1"/>
+          </a:fontRef>
+        </p:style>
+        <p:txBody>
+          <a:bodyPr rtlCol="0" anchor="ctr"/>
+          <a:lstStyle/>
+          <a:p>
+            <a:pPr algn="ctr"/>
+            <a:r>
+              <a:rPr lang="es-CO" sz="1400" b="1" dirty="0" smtClean="0"/>
+              <a:t>Rendimiento</a:t>
+            </a:r>
+            <a:endParaRPr lang="es-CO" sz="1400" b="1" dirty="0"/>
+          </a:p>
+        </p:txBody>
+      </p:sp>
+      <p:sp>
+        <p:nvSpPr>
+          <p:cNvPr id="68" name="Rounded Rectangle 67"/>
+          <p:cNvSpPr/>
+          <p:nvPr/>
+        </p:nvSpPr>
+        <p:spPr>
+          <a:xfrm>
+            <a:off x="2388880" y="4941168"/>
+            <a:ext cx="1463040" cy="365760"/>
+          </a:xfrm>
+          <a:prstGeom prst="roundRect">
+            <a:avLst/>
+          </a:prstGeom>
+        </p:spPr>
+        <p:style>
+          <a:lnRef idx="2">
+            <a:schemeClr val="accent1"/>
+          </a:lnRef>
+          <a:fillRef idx="1">
+            <a:schemeClr val="lt1"/>
+          </a:fillRef>
+          <a:effectRef idx="0">
+            <a:schemeClr val="accent1"/>
+          </a:effectRef>
+          <a:fontRef idx="minor">
+            <a:schemeClr val="dk1"/>
+          </a:fontRef>
+        </p:style>
+        <p:txBody>
+          <a:bodyPr rtlCol="0" anchor="ctr"/>
+          <a:lstStyle/>
+          <a:p>
+            <a:pPr algn="ctr"/>
+            <a:r>
+              <a:rPr lang="es-CO" sz="1400" b="1" dirty="0" smtClean="0"/>
+              <a:t>Tiempo</a:t>
+            </a:r>
+            <a:endParaRPr lang="es-CO" sz="1400" b="1" dirty="0"/>
+          </a:p>
+        </p:txBody>
+      </p:sp>
+      <p:sp>
+        <p:nvSpPr>
+          <p:cNvPr id="69" name="Rounded Rectangle 68"/>
+          <p:cNvSpPr/>
+          <p:nvPr/>
+        </p:nvSpPr>
+        <p:spPr>
+          <a:xfrm>
+            <a:off x="2388880" y="5759536"/>
+            <a:ext cx="1463040" cy="365760"/>
+          </a:xfrm>
+          <a:prstGeom prst="roundRect">
+            <a:avLst/>
+          </a:prstGeom>
+        </p:spPr>
+        <p:style>
+          <a:lnRef idx="2">
+            <a:schemeClr val="accent1"/>
+          </a:lnRef>
+          <a:fillRef idx="1">
+            <a:schemeClr val="lt1"/>
+          </a:fillRef>
+          <a:effectRef idx="0">
+            <a:schemeClr val="accent1"/>
+          </a:effectRef>
+          <a:fontRef idx="minor">
+            <a:schemeClr val="dk1"/>
+          </a:fontRef>
+        </p:style>
+        <p:txBody>
+          <a:bodyPr rtlCol="0" anchor="ctr"/>
+          <a:lstStyle/>
+          <a:p>
+            <a:pPr algn="ctr"/>
+            <a:r>
+              <a:rPr lang="es-CO" sz="1400" b="1" dirty="0" smtClean="0"/>
+              <a:t>Escalabilidad</a:t>
+            </a:r>
+            <a:endParaRPr lang="es-CO" sz="1400" b="1" dirty="0"/>
+          </a:p>
+        </p:txBody>
+      </p:sp>
+      <p:sp>
+        <p:nvSpPr>
+          <p:cNvPr id="70" name="Rounded Rectangle 69"/>
+          <p:cNvSpPr/>
+          <p:nvPr/>
+        </p:nvSpPr>
+        <p:spPr>
+          <a:xfrm>
+            <a:off x="2388880" y="6303600"/>
+            <a:ext cx="1463040" cy="365760"/>
+          </a:xfrm>
+          <a:prstGeom prst="roundRect">
+            <a:avLst/>
+          </a:prstGeom>
+        </p:spPr>
+        <p:style>
+          <a:lnRef idx="2">
+            <a:schemeClr val="accent1"/>
+          </a:lnRef>
+          <a:fillRef idx="1">
+            <a:schemeClr val="lt1"/>
+          </a:fillRef>
+          <a:effectRef idx="0">
+            <a:schemeClr val="accent1"/>
+          </a:effectRef>
+          <a:fontRef idx="minor">
+            <a:schemeClr val="dk1"/>
+          </a:fontRef>
+        </p:style>
+        <p:txBody>
+          <a:bodyPr rtlCol="0" anchor="ctr"/>
+          <a:lstStyle/>
+          <a:p>
+            <a:pPr algn="ctr"/>
+            <a:r>
+              <a:rPr lang="es-CO" sz="1400" b="1" dirty="0" smtClean="0"/>
+              <a:t>Confidencialidad</a:t>
+            </a:r>
+            <a:endParaRPr lang="es-CO" sz="1400" b="1" dirty="0"/>
+          </a:p>
+        </p:txBody>
+      </p:sp>
+      <p:cxnSp>
+        <p:nvCxnSpPr>
+          <p:cNvPr id="72" name="Straight Connector 71"/>
+          <p:cNvCxnSpPr>
+            <a:stCxn id="65" idx="3"/>
+            <a:endCxn id="19" idx="1"/>
+          </p:cNvCxnSpPr>
+          <p:nvPr/>
+        </p:nvCxnSpPr>
+        <p:spPr>
+          <a:xfrm>
+            <a:off x="3851920" y="1589936"/>
+            <a:ext cx="233184" cy="0"/>
+          </a:xfrm>
+          <a:prstGeom prst="line">
+            <a:avLst/>
+          </a:prstGeom>
+        </p:spPr>
+        <p:style>
+          <a:lnRef idx="2">
+            <a:schemeClr val="dk1"/>
+          </a:lnRef>
+          <a:fillRef idx="0">
+            <a:schemeClr val="dk1"/>
+          </a:fillRef>
+          <a:effectRef idx="1">
+            <a:schemeClr val="dk1"/>
+          </a:effectRef>
+          <a:fontRef idx="minor">
+            <a:schemeClr val="tx1"/>
+          </a:fontRef>
+        </p:style>
+      </p:cxnSp>
+      <p:cxnSp>
+        <p:nvCxnSpPr>
+          <p:cNvPr id="73" name="Straight Connector 72"/>
+          <p:cNvCxnSpPr>
+            <a:stCxn id="69" idx="3"/>
+            <a:endCxn id="27" idx="1"/>
+          </p:cNvCxnSpPr>
+          <p:nvPr/>
+        </p:nvCxnSpPr>
+        <p:spPr>
+          <a:xfrm>
+            <a:off x="3851920" y="5942416"/>
+            <a:ext cx="233184" cy="0"/>
+          </a:xfrm>
+          <a:prstGeom prst="line">
+            <a:avLst/>
+          </a:prstGeom>
+        </p:spPr>
+        <p:style>
+          <a:lnRef idx="2">
+            <a:schemeClr val="dk1"/>
+          </a:lnRef>
+          <a:fillRef idx="0">
+            <a:schemeClr val="dk1"/>
+          </a:fillRef>
+          <a:effectRef idx="1">
+            <a:schemeClr val="dk1"/>
+          </a:effectRef>
+          <a:fontRef idx="minor">
+            <a:schemeClr val="tx1"/>
+          </a:fontRef>
+        </p:style>
+      </p:cxnSp>
+      <p:cxnSp>
+        <p:nvCxnSpPr>
+          <p:cNvPr id="74" name="Straight Connector 73"/>
+          <p:cNvCxnSpPr>
+            <a:stCxn id="70" idx="3"/>
+            <a:endCxn id="28" idx="1"/>
+          </p:cNvCxnSpPr>
+          <p:nvPr/>
+        </p:nvCxnSpPr>
+        <p:spPr>
+          <a:xfrm>
+            <a:off x="3851920" y="6486480"/>
+            <a:ext cx="233184" cy="0"/>
+          </a:xfrm>
+          <a:prstGeom prst="line">
+            <a:avLst/>
+          </a:prstGeom>
+        </p:spPr>
+        <p:style>
+          <a:lnRef idx="2">
+            <a:schemeClr val="dk1"/>
+          </a:lnRef>
+          <a:fillRef idx="0">
+            <a:schemeClr val="dk1"/>
+          </a:fillRef>
+          <a:effectRef idx="1">
+            <a:schemeClr val="dk1"/>
+          </a:effectRef>
+          <a:fontRef idx="minor">
+            <a:schemeClr val="tx1"/>
+          </a:fontRef>
+        </p:style>
+      </p:cxnSp>
+      <p:cxnSp>
+        <p:nvCxnSpPr>
+          <p:cNvPr id="79" name="Straight Connector 78"/>
+          <p:cNvCxnSpPr>
+            <a:stCxn id="67" idx="3"/>
+            <a:endCxn id="24" idx="1"/>
+          </p:cNvCxnSpPr>
+          <p:nvPr/>
+        </p:nvCxnSpPr>
+        <p:spPr>
+          <a:xfrm>
+            <a:off x="3851920" y="4318238"/>
+            <a:ext cx="233184" cy="0"/>
+          </a:xfrm>
+          <a:prstGeom prst="line">
+            <a:avLst/>
+          </a:prstGeom>
+        </p:spPr>
+        <p:style>
+          <a:lnRef idx="2">
+            <a:schemeClr val="dk1"/>
+          </a:lnRef>
+          <a:fillRef idx="0">
+            <a:schemeClr val="dk1"/>
+          </a:fillRef>
+          <a:effectRef idx="1">
+            <a:schemeClr val="dk1"/>
+          </a:effectRef>
+          <a:fontRef idx="minor">
+            <a:schemeClr val="tx1"/>
+          </a:fontRef>
+        </p:style>
+      </p:cxnSp>
+      <p:cxnSp>
+        <p:nvCxnSpPr>
+          <p:cNvPr id="83" name="Elbow Connector 82"/>
+          <p:cNvCxnSpPr>
+            <a:stCxn id="20" idx="1"/>
+            <a:endCxn id="66" idx="3"/>
+          </p:cNvCxnSpPr>
+          <p:nvPr/>
+        </p:nvCxnSpPr>
+        <p:spPr>
+          <a:xfrm rot="10800000" flipV="1">
+            <a:off x="3851920" y="2133996"/>
+            <a:ext cx="233184" cy="824092"/>
+          </a:xfrm>
+          <a:prstGeom prst="bentConnector3">
+            <a:avLst>
+              <a:gd name="adj1" fmla="val 50000"/>
+            </a:avLst>
+          </a:prstGeom>
+        </p:spPr>
+        <p:style>
+          <a:lnRef idx="2">
+            <a:schemeClr val="dk1"/>
+          </a:lnRef>
+          <a:fillRef idx="0">
+            <a:schemeClr val="dk1"/>
+          </a:fillRef>
+          <a:effectRef idx="1">
+            <a:schemeClr val="dk1"/>
+          </a:effectRef>
+          <a:fontRef idx="minor">
+            <a:schemeClr val="tx1"/>
+          </a:fontRef>
+        </p:style>
+      </p:cxnSp>
+      <p:cxnSp>
+        <p:nvCxnSpPr>
+          <p:cNvPr id="86" name="Elbow Connector 85"/>
+          <p:cNvCxnSpPr>
+            <a:stCxn id="21" idx="1"/>
+            <a:endCxn id="66" idx="3"/>
+          </p:cNvCxnSpPr>
+          <p:nvPr/>
+        </p:nvCxnSpPr>
+        <p:spPr>
+          <a:xfrm rot="10800000" flipV="1">
+            <a:off x="3851920" y="2678056"/>
+            <a:ext cx="233184" cy="280032"/>
+          </a:xfrm>
+          <a:prstGeom prst="bentConnector3">
+            <a:avLst>
+              <a:gd name="adj1" fmla="val 50000"/>
+            </a:avLst>
+          </a:prstGeom>
+        </p:spPr>
+        <p:style>
+          <a:lnRef idx="2">
+            <a:schemeClr val="dk1"/>
+          </a:lnRef>
+          <a:fillRef idx="0">
+            <a:schemeClr val="dk1"/>
+          </a:fillRef>
+          <a:effectRef idx="1">
+            <a:schemeClr val="dk1"/>
+          </a:effectRef>
+          <a:fontRef idx="minor">
+            <a:schemeClr val="tx1"/>
+          </a:fontRef>
+        </p:style>
+      </p:cxnSp>
+      <p:cxnSp>
+        <p:nvCxnSpPr>
+          <p:cNvPr id="89" name="Elbow Connector 88"/>
+          <p:cNvCxnSpPr>
+            <a:stCxn id="23" idx="1"/>
+            <a:endCxn id="66" idx="3"/>
+          </p:cNvCxnSpPr>
+          <p:nvPr/>
+        </p:nvCxnSpPr>
+        <p:spPr>
+          <a:xfrm rot="10800000">
+            <a:off x="3851920" y="2958088"/>
+            <a:ext cx="233184" cy="808088"/>
+          </a:xfrm>
+          <a:prstGeom prst="bentConnector3">
+            <a:avLst>
+              <a:gd name="adj1" fmla="val 50000"/>
+            </a:avLst>
+          </a:prstGeom>
+        </p:spPr>
+        <p:style>
+          <a:lnRef idx="2">
+            <a:schemeClr val="dk1"/>
+          </a:lnRef>
+          <a:fillRef idx="0">
+            <a:schemeClr val="dk1"/>
+          </a:fillRef>
+          <a:effectRef idx="1">
+            <a:schemeClr val="dk1"/>
+          </a:effectRef>
+          <a:fontRef idx="minor">
+            <a:schemeClr val="tx1"/>
+          </a:fontRef>
+        </p:style>
+      </p:cxnSp>
+      <p:cxnSp>
+        <p:nvCxnSpPr>
+          <p:cNvPr id="90" name="Elbow Connector 89"/>
+          <p:cNvCxnSpPr>
+            <a:stCxn id="66" idx="3"/>
+            <a:endCxn id="22" idx="1"/>
+          </p:cNvCxnSpPr>
+          <p:nvPr/>
+        </p:nvCxnSpPr>
+        <p:spPr>
+          <a:xfrm>
+            <a:off x="3851920" y="2958088"/>
+            <a:ext cx="233184" cy="264028"/>
+          </a:xfrm>
+          <a:prstGeom prst="bentConnector3">
+            <a:avLst>
+              <a:gd name="adj1" fmla="val 50000"/>
+            </a:avLst>
+          </a:prstGeom>
+        </p:spPr>
+        <p:style>
+          <a:lnRef idx="2">
+            <a:schemeClr val="dk1"/>
+          </a:lnRef>
+          <a:fillRef idx="0">
+            <a:schemeClr val="dk1"/>
+          </a:fillRef>
+          <a:effectRef idx="1">
+            <a:schemeClr val="dk1"/>
+          </a:effectRef>
+          <a:fontRef idx="minor">
+            <a:schemeClr val="tx1"/>
+          </a:fontRef>
+        </p:style>
+      </p:cxnSp>
+      <p:cxnSp>
+        <p:nvCxnSpPr>
+          <p:cNvPr id="96" name="Elbow Connector 95"/>
+          <p:cNvCxnSpPr>
+            <a:stCxn id="25" idx="1"/>
+            <a:endCxn id="68" idx="3"/>
+          </p:cNvCxnSpPr>
+          <p:nvPr/>
+        </p:nvCxnSpPr>
+        <p:spPr>
+          <a:xfrm rot="10800000" flipV="1">
+            <a:off x="3851920" y="4854296"/>
+            <a:ext cx="233184" cy="269752"/>
+          </a:xfrm>
+          <a:prstGeom prst="bentConnector3">
+            <a:avLst>
+              <a:gd name="adj1" fmla="val 50000"/>
+            </a:avLst>
+          </a:prstGeom>
+        </p:spPr>
+        <p:style>
+          <a:lnRef idx="2">
+            <a:schemeClr val="dk1"/>
+          </a:lnRef>
+          <a:fillRef idx="0">
+            <a:schemeClr val="dk1"/>
+          </a:fillRef>
+          <a:effectRef idx="1">
+            <a:schemeClr val="dk1"/>
+          </a:effectRef>
+          <a:fontRef idx="minor">
+            <a:schemeClr val="tx1"/>
+          </a:fontRef>
+        </p:style>
+      </p:cxnSp>
+      <p:cxnSp>
+        <p:nvCxnSpPr>
+          <p:cNvPr id="99" name="Elbow Connector 98"/>
+          <p:cNvCxnSpPr>
+            <a:stCxn id="26" idx="1"/>
+            <a:endCxn id="68" idx="3"/>
+          </p:cNvCxnSpPr>
+          <p:nvPr/>
+        </p:nvCxnSpPr>
+        <p:spPr>
+          <a:xfrm rot="10800000">
+            <a:off x="3851920" y="5124048"/>
+            <a:ext cx="233184" cy="274308"/>
+          </a:xfrm>
+          <a:prstGeom prst="bentConnector3">
+            <a:avLst>
+              <a:gd name="adj1" fmla="val 50000"/>
+            </a:avLst>
+          </a:prstGeom>
+        </p:spPr>
+        <p:style>
+          <a:lnRef idx="2">
+            <a:schemeClr val="dk1"/>
+          </a:lnRef>
+          <a:fillRef idx="0">
+            <a:schemeClr val="dk1"/>
+          </a:fillRef>
+          <a:effectRef idx="1">
+            <a:schemeClr val="dk1"/>
+          </a:effectRef>
+          <a:fontRef idx="minor">
+            <a:schemeClr val="tx1"/>
+          </a:fontRef>
+        </p:style>
+      </p:cxnSp>
+      <p:sp>
+        <p:nvSpPr>
+          <p:cNvPr id="102" name="Rounded Rectangle 101"/>
+          <p:cNvSpPr/>
+          <p:nvPr/>
+        </p:nvSpPr>
+        <p:spPr>
+          <a:xfrm>
+            <a:off x="755576" y="2775208"/>
+            <a:ext cx="1463040" cy="365760"/>
+          </a:xfrm>
+          <a:prstGeom prst="roundRect">
+            <a:avLst/>
+          </a:prstGeom>
+        </p:spPr>
+        <p:style>
+          <a:lnRef idx="2">
+            <a:schemeClr val="accent1"/>
+          </a:lnRef>
+          <a:fillRef idx="1">
+            <a:schemeClr val="lt1"/>
+          </a:fillRef>
+          <a:effectRef idx="0">
+            <a:schemeClr val="accent1"/>
+          </a:effectRef>
+          <a:fontRef idx="minor">
+            <a:schemeClr val="dk1"/>
+          </a:fontRef>
+        </p:style>
+        <p:txBody>
+          <a:bodyPr rtlCol="0" anchor="ctr"/>
+          <a:lstStyle/>
+          <a:p>
+            <a:pPr algn="ctr"/>
+            <a:r>
+              <a:rPr lang="es-CO" sz="1400" b="1" dirty="0" smtClean="0"/>
+              <a:t>Desempeño</a:t>
+            </a:r>
+            <a:endParaRPr lang="es-CO" sz="1400" b="1" dirty="0"/>
+          </a:p>
+        </p:txBody>
+      </p:sp>
+      <p:sp>
+        <p:nvSpPr>
+          <p:cNvPr id="103" name="Rounded Rectangle 102"/>
+          <p:cNvSpPr/>
+          <p:nvPr/>
+        </p:nvSpPr>
+        <p:spPr>
+          <a:xfrm>
+            <a:off x="755576" y="4935448"/>
+            <a:ext cx="1463040" cy="365760"/>
+          </a:xfrm>
+          <a:prstGeom prst="roundRect">
+            <a:avLst/>
+          </a:prstGeom>
+        </p:spPr>
+        <p:style>
+          <a:lnRef idx="2">
+            <a:schemeClr val="accent1"/>
+          </a:lnRef>
+          <a:fillRef idx="1">
+            <a:schemeClr val="lt1"/>
+          </a:fillRef>
+          <a:effectRef idx="0">
+            <a:schemeClr val="accent1"/>
+          </a:effectRef>
+          <a:fontRef idx="minor">
+            <a:schemeClr val="dk1"/>
+          </a:fontRef>
+        </p:style>
+        <p:txBody>
+          <a:bodyPr rtlCol="0" anchor="ctr"/>
+          <a:lstStyle/>
+          <a:p>
+            <a:pPr algn="ctr"/>
+            <a:r>
+              <a:rPr lang="es-CO" sz="1400" b="1" dirty="0" smtClean="0"/>
+              <a:t>Disponibilidad</a:t>
+            </a:r>
+            <a:endParaRPr lang="es-CO" sz="1400" b="1" dirty="0"/>
+          </a:p>
+        </p:txBody>
+      </p:sp>
+      <p:sp>
+        <p:nvSpPr>
+          <p:cNvPr id="104" name="Rounded Rectangle 103"/>
+          <p:cNvSpPr/>
+          <p:nvPr/>
+        </p:nvSpPr>
+        <p:spPr>
+          <a:xfrm>
+            <a:off x="755576" y="5759536"/>
+            <a:ext cx="1463040" cy="365760"/>
+          </a:xfrm>
+          <a:prstGeom prst="roundRect">
+            <a:avLst/>
+          </a:prstGeom>
+        </p:spPr>
+        <p:style>
+          <a:lnRef idx="2">
+            <a:schemeClr val="accent1"/>
+          </a:lnRef>
+          <a:fillRef idx="1">
+            <a:schemeClr val="lt1"/>
+          </a:fillRef>
+          <a:effectRef idx="0">
+            <a:schemeClr val="accent1"/>
+          </a:effectRef>
+          <a:fontRef idx="minor">
+            <a:schemeClr val="dk1"/>
+          </a:fontRef>
+        </p:style>
+        <p:txBody>
+          <a:bodyPr rtlCol="0" anchor="ctr"/>
+          <a:lstStyle/>
+          <a:p>
+            <a:pPr algn="ctr"/>
+            <a:r>
+              <a:rPr lang="es-CO" sz="1400" b="1" dirty="0" err="1" smtClean="0"/>
+              <a:t>Modificabilidad</a:t>
+            </a:r>
+            <a:endParaRPr lang="es-CO" sz="1400" b="1" dirty="0"/>
+          </a:p>
+        </p:txBody>
+      </p:sp>
+      <p:sp>
+        <p:nvSpPr>
+          <p:cNvPr id="105" name="Rounded Rectangle 104"/>
+          <p:cNvSpPr/>
+          <p:nvPr/>
+        </p:nvSpPr>
+        <p:spPr>
+          <a:xfrm>
+            <a:off x="755576" y="6303600"/>
+            <a:ext cx="1463040" cy="365760"/>
+          </a:xfrm>
+          <a:prstGeom prst="roundRect">
+            <a:avLst/>
+          </a:prstGeom>
+        </p:spPr>
+        <p:style>
+          <a:lnRef idx="2">
+            <a:schemeClr val="accent1"/>
+          </a:lnRef>
+          <a:fillRef idx="1">
+            <a:schemeClr val="lt1"/>
+          </a:fillRef>
+          <a:effectRef idx="0">
+            <a:schemeClr val="accent1"/>
+          </a:effectRef>
+          <a:fontRef idx="minor">
+            <a:schemeClr val="dk1"/>
+          </a:fontRef>
+        </p:style>
+        <p:txBody>
+          <a:bodyPr rtlCol="0" anchor="ctr"/>
+          <a:lstStyle/>
+          <a:p>
+            <a:pPr algn="ctr"/>
+            <a:r>
+              <a:rPr lang="es-CO" sz="1400" b="1" dirty="0" smtClean="0"/>
+              <a:t>Seguridad</a:t>
+            </a:r>
+            <a:endParaRPr lang="es-CO" sz="1400" b="1" dirty="0"/>
+          </a:p>
+        </p:txBody>
+      </p:sp>
+      <p:cxnSp>
+        <p:nvCxnSpPr>
+          <p:cNvPr id="106" name="Elbow Connector 105"/>
+          <p:cNvCxnSpPr>
+            <a:stCxn id="65" idx="1"/>
+            <a:endCxn id="102" idx="3"/>
+          </p:cNvCxnSpPr>
+          <p:nvPr/>
+        </p:nvCxnSpPr>
+        <p:spPr>
+          <a:xfrm rot="10800000" flipV="1">
+            <a:off x="2218616" y="1589936"/>
+            <a:ext cx="170264" cy="1368152"/>
+          </a:xfrm>
+          <a:prstGeom prst="bentConnector3">
+            <a:avLst>
+              <a:gd name="adj1" fmla="val 50000"/>
+            </a:avLst>
+          </a:prstGeom>
+        </p:spPr>
+        <p:style>
+          <a:lnRef idx="2">
+            <a:schemeClr val="dk1"/>
+          </a:lnRef>
+          <a:fillRef idx="0">
+            <a:schemeClr val="dk1"/>
+          </a:fillRef>
+          <a:effectRef idx="1">
+            <a:schemeClr val="dk1"/>
+          </a:effectRef>
+          <a:fontRef idx="minor">
+            <a:schemeClr val="tx1"/>
+          </a:fontRef>
+        </p:style>
+      </p:cxnSp>
+      <p:cxnSp>
+        <p:nvCxnSpPr>
+          <p:cNvPr id="112" name="Elbow Connector 111"/>
+          <p:cNvCxnSpPr>
+            <a:stCxn id="102" idx="3"/>
+            <a:endCxn id="67" idx="1"/>
+          </p:cNvCxnSpPr>
+          <p:nvPr/>
+        </p:nvCxnSpPr>
+        <p:spPr>
+          <a:xfrm>
+            <a:off x="2218616" y="2958088"/>
+            <a:ext cx="170264" cy="1360150"/>
+          </a:xfrm>
+          <a:prstGeom prst="bentConnector3">
+            <a:avLst>
+              <a:gd name="adj1" fmla="val 50000"/>
+            </a:avLst>
+          </a:prstGeom>
+        </p:spPr>
+        <p:style>
+          <a:lnRef idx="2">
+            <a:schemeClr val="dk1"/>
+          </a:lnRef>
+          <a:fillRef idx="0">
+            <a:schemeClr val="dk1"/>
+          </a:fillRef>
+          <a:effectRef idx="1">
+            <a:schemeClr val="dk1"/>
+          </a:effectRef>
+          <a:fontRef idx="minor">
+            <a:schemeClr val="tx1"/>
+          </a:fontRef>
+        </p:style>
+      </p:cxnSp>
+      <p:cxnSp>
+        <p:nvCxnSpPr>
+          <p:cNvPr id="121" name="Straight Connector 120"/>
+          <p:cNvCxnSpPr>
+            <a:stCxn id="66" idx="1"/>
+            <a:endCxn id="102" idx="3"/>
+          </p:cNvCxnSpPr>
+          <p:nvPr/>
+        </p:nvCxnSpPr>
+        <p:spPr>
+          <a:xfrm rot="10800000">
+            <a:off x="2218616" y="2958088"/>
+            <a:ext cx="170264" cy="0"/>
+          </a:xfrm>
+          <a:prstGeom prst="line">
+            <a:avLst/>
+          </a:prstGeom>
+        </p:spPr>
+        <p:style>
+          <a:lnRef idx="2">
+            <a:schemeClr val="dk1"/>
+          </a:lnRef>
+          <a:fillRef idx="0">
+            <a:schemeClr val="dk1"/>
+          </a:fillRef>
+          <a:effectRef idx="1">
+            <a:schemeClr val="dk1"/>
+          </a:effectRef>
+          <a:fontRef idx="minor">
+            <a:schemeClr val="tx1"/>
+          </a:fontRef>
+        </p:style>
+      </p:cxnSp>
+      <p:cxnSp>
+        <p:nvCxnSpPr>
+          <p:cNvPr id="122" name="Straight Connector 121"/>
+          <p:cNvCxnSpPr>
+            <a:stCxn id="104" idx="3"/>
+            <a:endCxn id="69" idx="1"/>
+          </p:cNvCxnSpPr>
+          <p:nvPr/>
+        </p:nvCxnSpPr>
+        <p:spPr>
+          <a:xfrm>
+            <a:off x="2218616" y="5942416"/>
+            <a:ext cx="170264" cy="0"/>
+          </a:xfrm>
+          <a:prstGeom prst="line">
+            <a:avLst/>
+          </a:prstGeom>
+        </p:spPr>
+        <p:style>
+          <a:lnRef idx="2">
+            <a:schemeClr val="dk1"/>
+          </a:lnRef>
+          <a:fillRef idx="0">
+            <a:schemeClr val="dk1"/>
+          </a:fillRef>
+          <a:effectRef idx="1">
+            <a:schemeClr val="dk1"/>
+          </a:effectRef>
+          <a:fontRef idx="minor">
+            <a:schemeClr val="tx1"/>
+          </a:fontRef>
+        </p:style>
+      </p:cxnSp>
+      <p:cxnSp>
+        <p:nvCxnSpPr>
+          <p:cNvPr id="123" name="Straight Connector 122"/>
+          <p:cNvCxnSpPr>
+            <a:stCxn id="103" idx="3"/>
+            <a:endCxn id="68" idx="1"/>
+          </p:cNvCxnSpPr>
+          <p:nvPr/>
+        </p:nvCxnSpPr>
+        <p:spPr>
+          <a:xfrm>
+            <a:off x="2218616" y="5118328"/>
+            <a:ext cx="170264" cy="5720"/>
+          </a:xfrm>
+          <a:prstGeom prst="line">
+            <a:avLst/>
+          </a:prstGeom>
+        </p:spPr>
+        <p:style>
+          <a:lnRef idx="2">
+            <a:schemeClr val="dk1"/>
+          </a:lnRef>
+          <a:fillRef idx="0">
+            <a:schemeClr val="dk1"/>
+          </a:fillRef>
+          <a:effectRef idx="1">
+            <a:schemeClr val="dk1"/>
+          </a:effectRef>
+          <a:fontRef idx="minor">
+            <a:schemeClr val="tx1"/>
+          </a:fontRef>
+        </p:style>
+      </p:cxnSp>
+      <p:cxnSp>
+        <p:nvCxnSpPr>
+          <p:cNvPr id="124" name="Straight Connector 123"/>
+          <p:cNvCxnSpPr>
+            <a:stCxn id="105" idx="3"/>
+            <a:endCxn id="70" idx="1"/>
+          </p:cNvCxnSpPr>
+          <p:nvPr/>
+        </p:nvCxnSpPr>
+        <p:spPr>
+          <a:xfrm>
+            <a:off x="2218616" y="6486480"/>
+            <a:ext cx="170264" cy="0"/>
+          </a:xfrm>
+          <a:prstGeom prst="line">
+            <a:avLst/>
+          </a:prstGeom>
+        </p:spPr>
+        <p:style>
+          <a:lnRef idx="2">
+            <a:schemeClr val="dk1"/>
+          </a:lnRef>
+          <a:fillRef idx="0">
+            <a:schemeClr val="dk1"/>
+          </a:fillRef>
+          <a:effectRef idx="1">
+            <a:schemeClr val="dk1"/>
+          </a:effectRef>
+          <a:fontRef idx="minor">
+            <a:schemeClr val="tx1"/>
+          </a:fontRef>
+        </p:style>
+      </p:cxnSp>
+      <p:sp>
+        <p:nvSpPr>
+          <p:cNvPr id="137" name="TextBox 136"/>
+          <p:cNvSpPr txBox="1"/>
+          <p:nvPr/>
+        </p:nvSpPr>
+        <p:spPr>
+          <a:xfrm>
+            <a:off x="107504" y="3861048"/>
+            <a:ext cx="365760" cy="365760"/>
+          </a:xfrm>
+          <a:prstGeom prst="ellipse">
+            <a:avLst/>
+          </a:prstGeom>
+        </p:spPr>
+        <p:style>
+          <a:lnRef idx="1">
+            <a:schemeClr val="accent3"/>
+          </a:lnRef>
+          <a:fillRef idx="3">
+            <a:schemeClr val="accent3"/>
+          </a:fillRef>
+          <a:effectRef idx="2">
+            <a:schemeClr val="accent3"/>
+          </a:effectRef>
+          <a:fontRef idx="minor">
+            <a:schemeClr val="lt1"/>
+          </a:fontRef>
+        </p:style>
+        <p:txBody>
+          <a:bodyPr wrap="square" rtlCol="0" anchor="ctr">
+            <a:spAutoFit/>
+          </a:bodyPr>
+          <a:lstStyle/>
+          <a:p>
+            <a:pPr algn="ctr"/>
+            <a:r>
+              <a:rPr lang="es-CO" b="1" dirty="0" smtClean="0">
+                <a:solidFill>
+                  <a:schemeClr val="bg1"/>
+                </a:solidFill>
+                <a:effectLst>
+                  <a:outerShdw blurRad="38100" dist="38100" dir="2700000" algn="tl">
+                    <a:srgbClr val="000000">
+                      <a:alpha val="43137"/>
+                    </a:srgbClr>
+                  </a:outerShdw>
+                </a:effectLst>
+              </a:rPr>
+              <a:t>U</a:t>
+            </a:r>
+            <a:endParaRPr lang="es-CO" b="1" dirty="0">
+              <a:solidFill>
+                <a:schemeClr val="bg1"/>
+              </a:solidFill>
+              <a:effectLst>
+                <a:outerShdw blurRad="38100" dist="38100" dir="2700000" algn="tl">
+                  <a:srgbClr val="000000">
+                    <a:alpha val="43137"/>
+                  </a:srgbClr>
+                </a:outerShdw>
+              </a:effectLst>
+            </a:endParaRPr>
+          </a:p>
+        </p:txBody>
+      </p:sp>
+      <p:cxnSp>
+        <p:nvCxnSpPr>
+          <p:cNvPr id="138" name="Elbow Connector 137"/>
+          <p:cNvCxnSpPr>
+            <a:stCxn id="102" idx="1"/>
+            <a:endCxn id="137" idx="6"/>
+          </p:cNvCxnSpPr>
+          <p:nvPr/>
+        </p:nvCxnSpPr>
+        <p:spPr>
+          <a:xfrm rot="10800000" flipV="1">
+            <a:off x="473264" y="2958088"/>
+            <a:ext cx="282312" cy="1085840"/>
+          </a:xfrm>
+          <a:prstGeom prst="bentConnector3">
+            <a:avLst>
+              <a:gd name="adj1" fmla="val 50000"/>
+            </a:avLst>
+          </a:prstGeom>
+        </p:spPr>
+        <p:style>
+          <a:lnRef idx="2">
+            <a:schemeClr val="dk1"/>
+          </a:lnRef>
+          <a:fillRef idx="0">
+            <a:schemeClr val="dk1"/>
+          </a:fillRef>
+          <a:effectRef idx="1">
+            <a:schemeClr val="dk1"/>
+          </a:effectRef>
+          <a:fontRef idx="minor">
+            <a:schemeClr val="tx1"/>
+          </a:fontRef>
+        </p:style>
+      </p:cxnSp>
+      <p:cxnSp>
+        <p:nvCxnSpPr>
+          <p:cNvPr id="141" name="Elbow Connector 140"/>
+          <p:cNvCxnSpPr>
+            <a:stCxn id="137" idx="6"/>
+            <a:endCxn id="104" idx="1"/>
+          </p:cNvCxnSpPr>
+          <p:nvPr/>
+        </p:nvCxnSpPr>
+        <p:spPr>
+          <a:xfrm>
+            <a:off x="473264" y="4043928"/>
+            <a:ext cx="282312" cy="1898488"/>
+          </a:xfrm>
+          <a:prstGeom prst="bentConnector3">
+            <a:avLst>
+              <a:gd name="adj1" fmla="val 50000"/>
+            </a:avLst>
+          </a:prstGeom>
+        </p:spPr>
+        <p:style>
+          <a:lnRef idx="2">
+            <a:schemeClr val="dk1"/>
+          </a:lnRef>
+          <a:fillRef idx="0">
+            <a:schemeClr val="dk1"/>
+          </a:fillRef>
+          <a:effectRef idx="1">
+            <a:schemeClr val="dk1"/>
+          </a:effectRef>
+          <a:fontRef idx="minor">
+            <a:schemeClr val="tx1"/>
+          </a:fontRef>
+        </p:style>
+      </p:cxnSp>
+      <p:cxnSp>
+        <p:nvCxnSpPr>
+          <p:cNvPr id="142" name="Elbow Connector 141"/>
+          <p:cNvCxnSpPr>
+            <a:stCxn id="137" idx="6"/>
+            <a:endCxn id="103" idx="1"/>
+          </p:cNvCxnSpPr>
+          <p:nvPr/>
+        </p:nvCxnSpPr>
+        <p:spPr>
+          <a:xfrm>
+            <a:off x="473264" y="4043928"/>
+            <a:ext cx="282312" cy="1074400"/>
+          </a:xfrm>
+          <a:prstGeom prst="bentConnector3">
+            <a:avLst>
+              <a:gd name="adj1" fmla="val 50000"/>
+            </a:avLst>
+          </a:prstGeom>
+        </p:spPr>
+        <p:style>
+          <a:lnRef idx="2">
+            <a:schemeClr val="dk1"/>
+          </a:lnRef>
+          <a:fillRef idx="0">
+            <a:schemeClr val="dk1"/>
+          </a:fillRef>
+          <a:effectRef idx="1">
+            <a:schemeClr val="dk1"/>
+          </a:effectRef>
+          <a:fontRef idx="minor">
+            <a:schemeClr val="tx1"/>
+          </a:fontRef>
+        </p:style>
+      </p:cxnSp>
+      <p:cxnSp>
+        <p:nvCxnSpPr>
+          <p:cNvPr id="143" name="Elbow Connector 142"/>
+          <p:cNvCxnSpPr>
+            <a:stCxn id="137" idx="6"/>
+            <a:endCxn id="105" idx="1"/>
+          </p:cNvCxnSpPr>
+          <p:nvPr/>
+        </p:nvCxnSpPr>
+        <p:spPr>
+          <a:xfrm>
+            <a:off x="473264" y="4043928"/>
+            <a:ext cx="282312" cy="2442552"/>
+          </a:xfrm>
+          <a:prstGeom prst="bentConnector3">
+            <a:avLst>
+              <a:gd name="adj1" fmla="val 50000"/>
+            </a:avLst>
+          </a:prstGeom>
+        </p:spPr>
+        <p:style>
+          <a:lnRef idx="2">
+            <a:schemeClr val="dk1"/>
+          </a:lnRef>
+          <a:fillRef idx="0">
+            <a:schemeClr val="dk1"/>
+          </a:fillRef>
+          <a:effectRef idx="1">
+            <a:schemeClr val="dk1"/>
+          </a:effectRef>
+          <a:fontRef idx="minor">
+            <a:schemeClr val="tx1"/>
+          </a:fontRef>
+        </p:style>
+      </p:cxnSp>
     </p:spTree>
   </p:cSld>
   <p:clrMapOvr>

</xml_diff>